<commit_message>
Modified COA TB, moved OODP PPTs
</commit_message>
<xml_diff>
--- a/S4/02. COA/Notes & PPTs/Module 5.2.2 - Processor organization.pptx
+++ b/S4/02. COA/Notes & PPTs/Module 5.2.2 - Processor organization.pptx
@@ -142,6 +142,22 @@
       </a:defRPr>
     </a:lvl9pPr>
   </p:defaultTextStyle>
+  <p:extLst>
+    <p:ext uri="{EFAFB233-063F-42B5-8137-9DF3F51BA10A}">
+      <p15:sldGuideLst xmlns:p15="http://schemas.microsoft.com/office/powerpoint/2012/main">
+        <p15:guide id="1" orient="horz" pos="2160">
+          <p15:clr>
+            <a:srgbClr val="A4A3A4"/>
+          </p15:clr>
+        </p15:guide>
+        <p15:guide id="2" pos="2880">
+          <p15:clr>
+            <a:srgbClr val="A4A3A4"/>
+          </p15:clr>
+        </p15:guide>
+      </p15:sldGuideLst>
+    </p:ext>
+  </p:extLst>
 </p:presentation>
 </file>
 
@@ -189,7 +205,7 @@
           </a:lstStyle>
           <a:p>
             <a:r>
-              <a:rPr lang="en-US" smtClean="0"/>
+              <a:rPr lang="en-US"/>
               <a:t>Click to edit Master title style</a:t>
             </a:r>
             <a:endParaRPr lang="en-US" dirty="0"/>
@@ -309,7 +325,7 @@
           </a:lstStyle>
           <a:p>
             <a:r>
-              <a:rPr lang="en-US" smtClean="0"/>
+              <a:rPr lang="en-US"/>
               <a:t>Click to edit Master subtitle style</a:t>
             </a:r>
             <a:endParaRPr lang="en-US" dirty="0"/>
@@ -334,7 +350,7 @@
             <a:fld id="{8CA8C114-48A9-423B-993A-755139EE928F}" type="datetimeFigureOut">
               <a:rPr lang="en-IN" smtClean="0"/>
               <a:pPr/>
-              <a:t>24-04-2019</a:t>
+              <a:t>21-05-2019</a:t>
             </a:fld>
             <a:endParaRPr lang="en-IN"/>
           </a:p>
@@ -459,10 +475,9 @@
           <a:lstStyle/>
           <a:p>
             <a:r>
-              <a:rPr lang="en-US" smtClean="0"/>
+              <a:rPr lang="en-US"/>
               <a:t>Click to edit Master title style</a:t>
             </a:r>
-            <a:endParaRPr lang="en-US"/>
           </a:p>
         </p:txBody>
       </p:sp>
@@ -483,38 +498,37 @@
           <a:p>
             <a:pPr lvl="0"/>
             <a:r>
-              <a:rPr lang="en-US" smtClean="0"/>
+              <a:rPr lang="en-US"/>
               <a:t>Click to edit Master text styles</a:t>
             </a:r>
           </a:p>
           <a:p>
             <a:pPr lvl="1"/>
             <a:r>
-              <a:rPr lang="en-US" smtClean="0"/>
+              <a:rPr lang="en-US"/>
               <a:t>Second level</a:t>
             </a:r>
           </a:p>
           <a:p>
             <a:pPr lvl="2"/>
             <a:r>
-              <a:rPr lang="en-US" smtClean="0"/>
+              <a:rPr lang="en-US"/>
               <a:t>Third level</a:t>
             </a:r>
           </a:p>
           <a:p>
             <a:pPr lvl="3"/>
             <a:r>
-              <a:rPr lang="en-US" smtClean="0"/>
+              <a:rPr lang="en-US"/>
               <a:t>Fourth level</a:t>
             </a:r>
           </a:p>
           <a:p>
             <a:pPr lvl="4"/>
             <a:r>
-              <a:rPr lang="en-US" smtClean="0"/>
+              <a:rPr lang="en-US"/>
               <a:t>Fifth level</a:t>
             </a:r>
-            <a:endParaRPr lang="en-US"/>
           </a:p>
         </p:txBody>
       </p:sp>
@@ -536,7 +550,7 @@
             <a:fld id="{8CA8C114-48A9-423B-993A-755139EE928F}" type="datetimeFigureOut">
               <a:rPr lang="en-IN" smtClean="0"/>
               <a:pPr/>
-              <a:t>24-04-2019</a:t>
+              <a:t>21-05-2019</a:t>
             </a:fld>
             <a:endParaRPr lang="en-IN"/>
           </a:p>
@@ -631,7 +645,7 @@
           <a:lstStyle/>
           <a:p>
             <a:r>
-              <a:rPr lang="en-US" smtClean="0"/>
+              <a:rPr lang="en-US"/>
               <a:t>Click to edit Master title style</a:t>
             </a:r>
             <a:endParaRPr lang="en-US" dirty="0"/>
@@ -660,35 +674,35 @@
           <a:p>
             <a:pPr lvl="0"/>
             <a:r>
-              <a:rPr lang="en-US" smtClean="0"/>
+              <a:rPr lang="en-US"/>
               <a:t>Click to edit Master text styles</a:t>
             </a:r>
           </a:p>
           <a:p>
             <a:pPr lvl="1"/>
             <a:r>
-              <a:rPr lang="en-US" smtClean="0"/>
+              <a:rPr lang="en-US"/>
               <a:t>Second level</a:t>
             </a:r>
           </a:p>
           <a:p>
             <a:pPr lvl="2"/>
             <a:r>
-              <a:rPr lang="en-US" smtClean="0"/>
+              <a:rPr lang="en-US"/>
               <a:t>Third level</a:t>
             </a:r>
           </a:p>
           <a:p>
             <a:pPr lvl="3"/>
             <a:r>
-              <a:rPr lang="en-US" smtClean="0"/>
+              <a:rPr lang="en-US"/>
               <a:t>Fourth level</a:t>
             </a:r>
           </a:p>
           <a:p>
             <a:pPr lvl="4"/>
             <a:r>
-              <a:rPr lang="en-US" smtClean="0"/>
+              <a:rPr lang="en-US"/>
               <a:t>Fifth level</a:t>
             </a:r>
             <a:endParaRPr lang="en-US" dirty="0"/>
@@ -713,7 +727,7 @@
             <a:fld id="{8CA8C114-48A9-423B-993A-755139EE928F}" type="datetimeFigureOut">
               <a:rPr lang="en-IN" smtClean="0"/>
               <a:pPr/>
-              <a:t>24-04-2019</a:t>
+              <a:t>21-05-2019</a:t>
             </a:fld>
             <a:endParaRPr lang="en-IN"/>
           </a:p>
@@ -803,10 +817,9 @@
           <a:lstStyle/>
           <a:p>
             <a:r>
-              <a:rPr lang="en-US" smtClean="0"/>
+              <a:rPr lang="en-US"/>
               <a:t>Click to edit Master title style</a:t>
             </a:r>
-            <a:endParaRPr lang="en-US"/>
           </a:p>
         </p:txBody>
       </p:sp>
@@ -827,38 +840,37 @@
           <a:p>
             <a:pPr lvl="0"/>
             <a:r>
-              <a:rPr lang="en-US" smtClean="0"/>
+              <a:rPr lang="en-US"/>
               <a:t>Click to edit Master text styles</a:t>
             </a:r>
           </a:p>
           <a:p>
             <a:pPr lvl="1"/>
             <a:r>
-              <a:rPr lang="en-US" smtClean="0"/>
+              <a:rPr lang="en-US"/>
               <a:t>Second level</a:t>
             </a:r>
           </a:p>
           <a:p>
             <a:pPr lvl="2"/>
             <a:r>
-              <a:rPr lang="en-US" smtClean="0"/>
+              <a:rPr lang="en-US"/>
               <a:t>Third level</a:t>
             </a:r>
           </a:p>
           <a:p>
             <a:pPr lvl="3"/>
             <a:r>
-              <a:rPr lang="en-US" smtClean="0"/>
+              <a:rPr lang="en-US"/>
               <a:t>Fourth level</a:t>
             </a:r>
           </a:p>
           <a:p>
             <a:pPr lvl="4"/>
             <a:r>
-              <a:rPr lang="en-US" smtClean="0"/>
+              <a:rPr lang="en-US"/>
               <a:t>Fifth level</a:t>
             </a:r>
-            <a:endParaRPr lang="en-US"/>
           </a:p>
         </p:txBody>
       </p:sp>
@@ -880,7 +892,7 @@
             <a:fld id="{8CA8C114-48A9-423B-993A-755139EE928F}" type="datetimeFigureOut">
               <a:rPr lang="en-IN" smtClean="0"/>
               <a:pPr/>
-              <a:t>24-04-2019</a:t>
+              <a:t>21-05-2019</a:t>
             </a:fld>
             <a:endParaRPr lang="en-IN"/>
           </a:p>
@@ -986,7 +998,7 @@
           </a:lstStyle>
           <a:p>
             <a:r>
-              <a:rPr lang="en-US" smtClean="0"/>
+              <a:rPr lang="en-US"/>
               <a:t>Click to edit Master title style</a:t>
             </a:r>
             <a:endParaRPr lang="en-US" dirty="0"/>
@@ -1106,7 +1118,7 @@
           <a:p>
             <a:pPr lvl="0"/>
             <a:r>
-              <a:rPr lang="en-US" smtClean="0"/>
+              <a:rPr lang="en-US"/>
               <a:t>Click to edit Master text styles</a:t>
             </a:r>
           </a:p>
@@ -1130,7 +1142,7 @@
             <a:fld id="{8CA8C114-48A9-423B-993A-755139EE928F}" type="datetimeFigureOut">
               <a:rPr lang="en-IN" smtClean="0"/>
               <a:pPr/>
-              <a:t>24-04-2019</a:t>
+              <a:t>21-05-2019</a:t>
             </a:fld>
             <a:endParaRPr lang="en-IN"/>
           </a:p>
@@ -1255,10 +1267,9 @@
           <a:lstStyle/>
           <a:p>
             <a:r>
-              <a:rPr lang="en-US" smtClean="0"/>
+              <a:rPr lang="en-US"/>
               <a:t>Click to edit Master title style</a:t>
             </a:r>
-            <a:endParaRPr lang="en-US"/>
           </a:p>
         </p:txBody>
       </p:sp>
@@ -1312,35 +1323,35 @@
           <a:p>
             <a:pPr lvl="0"/>
             <a:r>
-              <a:rPr lang="en-US" smtClean="0"/>
+              <a:rPr lang="en-US"/>
               <a:t>Click to edit Master text styles</a:t>
             </a:r>
           </a:p>
           <a:p>
             <a:pPr lvl="1"/>
             <a:r>
-              <a:rPr lang="en-US" smtClean="0"/>
+              <a:rPr lang="en-US"/>
               <a:t>Second level</a:t>
             </a:r>
           </a:p>
           <a:p>
             <a:pPr lvl="2"/>
             <a:r>
-              <a:rPr lang="en-US" smtClean="0"/>
+              <a:rPr lang="en-US"/>
               <a:t>Third level</a:t>
             </a:r>
           </a:p>
           <a:p>
             <a:pPr lvl="3"/>
             <a:r>
-              <a:rPr lang="en-US" smtClean="0"/>
+              <a:rPr lang="en-US"/>
               <a:t>Fourth level</a:t>
             </a:r>
           </a:p>
           <a:p>
             <a:pPr lvl="4"/>
             <a:r>
-              <a:rPr lang="en-US" smtClean="0"/>
+              <a:rPr lang="en-US"/>
               <a:t>Fifth level</a:t>
             </a:r>
             <a:endParaRPr lang="en-US" dirty="0"/>
@@ -1397,35 +1408,35 @@
           <a:p>
             <a:pPr lvl="0"/>
             <a:r>
-              <a:rPr lang="en-US" smtClean="0"/>
+              <a:rPr lang="en-US"/>
               <a:t>Click to edit Master text styles</a:t>
             </a:r>
           </a:p>
           <a:p>
             <a:pPr lvl="1"/>
             <a:r>
-              <a:rPr lang="en-US" smtClean="0"/>
+              <a:rPr lang="en-US"/>
               <a:t>Second level</a:t>
             </a:r>
           </a:p>
           <a:p>
             <a:pPr lvl="2"/>
             <a:r>
-              <a:rPr lang="en-US" smtClean="0"/>
+              <a:rPr lang="en-US"/>
               <a:t>Third level</a:t>
             </a:r>
           </a:p>
           <a:p>
             <a:pPr lvl="3"/>
             <a:r>
-              <a:rPr lang="en-US" smtClean="0"/>
+              <a:rPr lang="en-US"/>
               <a:t>Fourth level</a:t>
             </a:r>
           </a:p>
           <a:p>
             <a:pPr lvl="4"/>
             <a:r>
-              <a:rPr lang="en-US" smtClean="0"/>
+              <a:rPr lang="en-US"/>
               <a:t>Fifth level</a:t>
             </a:r>
             <a:endParaRPr lang="en-US" dirty="0"/>
@@ -1450,7 +1461,7 @@
             <a:fld id="{8CA8C114-48A9-423B-993A-755139EE928F}" type="datetimeFigureOut">
               <a:rPr lang="en-IN" smtClean="0"/>
               <a:pPr/>
-              <a:t>24-04-2019</a:t>
+              <a:t>21-05-2019</a:t>
             </a:fld>
             <a:endParaRPr lang="en-IN"/>
           </a:p>
@@ -1544,7 +1555,7 @@
           </a:lstStyle>
           <a:p>
             <a:r>
-              <a:rPr lang="en-US" smtClean="0"/>
+              <a:rPr lang="en-US"/>
               <a:t>Click to edit Master title style</a:t>
             </a:r>
             <a:endParaRPr lang="en-US" dirty="0"/>
@@ -1633,7 +1644,7 @@
           <a:p>
             <a:pPr lvl="0"/>
             <a:r>
-              <a:rPr lang="en-US" smtClean="0"/>
+              <a:rPr lang="en-US"/>
               <a:t>Click to edit Master text styles</a:t>
             </a:r>
           </a:p>
@@ -1689,35 +1700,35 @@
           <a:p>
             <a:pPr lvl="0"/>
             <a:r>
-              <a:rPr lang="en-US" smtClean="0"/>
+              <a:rPr lang="en-US"/>
               <a:t>Click to edit Master text styles</a:t>
             </a:r>
           </a:p>
           <a:p>
             <a:pPr lvl="1"/>
             <a:r>
-              <a:rPr lang="en-US" smtClean="0"/>
+              <a:rPr lang="en-US"/>
               <a:t>Second level</a:t>
             </a:r>
           </a:p>
           <a:p>
             <a:pPr lvl="2"/>
             <a:r>
-              <a:rPr lang="en-US" smtClean="0"/>
+              <a:rPr lang="en-US"/>
               <a:t>Third level</a:t>
             </a:r>
           </a:p>
           <a:p>
             <a:pPr lvl="3"/>
             <a:r>
-              <a:rPr lang="en-US" smtClean="0"/>
+              <a:rPr lang="en-US"/>
               <a:t>Fourth level</a:t>
             </a:r>
           </a:p>
           <a:p>
             <a:pPr lvl="4"/>
             <a:r>
-              <a:rPr lang="en-US" smtClean="0"/>
+              <a:rPr lang="en-US"/>
               <a:t>Fifth level</a:t>
             </a:r>
             <a:endParaRPr lang="en-US" dirty="0"/>
@@ -1809,7 +1820,7 @@
           <a:p>
             <a:pPr lvl="0"/>
             <a:r>
-              <a:rPr lang="en-US" smtClean="0"/>
+              <a:rPr lang="en-US"/>
               <a:t>Click to edit Master text styles</a:t>
             </a:r>
           </a:p>
@@ -1865,35 +1876,35 @@
           <a:p>
             <a:pPr lvl="0"/>
             <a:r>
-              <a:rPr lang="en-US" smtClean="0"/>
+              <a:rPr lang="en-US"/>
               <a:t>Click to edit Master text styles</a:t>
             </a:r>
           </a:p>
           <a:p>
             <a:pPr lvl="1"/>
             <a:r>
-              <a:rPr lang="en-US" smtClean="0"/>
+              <a:rPr lang="en-US"/>
               <a:t>Second level</a:t>
             </a:r>
           </a:p>
           <a:p>
             <a:pPr lvl="2"/>
             <a:r>
-              <a:rPr lang="en-US" smtClean="0"/>
+              <a:rPr lang="en-US"/>
               <a:t>Third level</a:t>
             </a:r>
           </a:p>
           <a:p>
             <a:pPr lvl="3"/>
             <a:r>
-              <a:rPr lang="en-US" smtClean="0"/>
+              <a:rPr lang="en-US"/>
               <a:t>Fourth level</a:t>
             </a:r>
           </a:p>
           <a:p>
             <a:pPr lvl="4"/>
             <a:r>
-              <a:rPr lang="en-US" smtClean="0"/>
+              <a:rPr lang="en-US"/>
               <a:t>Fifth level</a:t>
             </a:r>
             <a:endParaRPr lang="en-US" dirty="0"/>
@@ -1918,7 +1929,7 @@
             <a:fld id="{8CA8C114-48A9-423B-993A-755139EE928F}" type="datetimeFigureOut">
               <a:rPr lang="en-IN" smtClean="0"/>
               <a:pPr/>
-              <a:t>24-04-2019</a:t>
+              <a:t>21-05-2019</a:t>
             </a:fld>
             <a:endParaRPr lang="en-IN"/>
           </a:p>
@@ -2043,10 +2054,9 @@
           <a:lstStyle/>
           <a:p>
             <a:r>
-              <a:rPr lang="en-US" smtClean="0"/>
+              <a:rPr lang="en-US"/>
               <a:t>Click to edit Master title style</a:t>
             </a:r>
-            <a:endParaRPr lang="en-US"/>
           </a:p>
         </p:txBody>
       </p:sp>
@@ -2068,7 +2078,7 @@
             <a:fld id="{8CA8C114-48A9-423B-993A-755139EE928F}" type="datetimeFigureOut">
               <a:rPr lang="en-IN" smtClean="0"/>
               <a:pPr/>
-              <a:t>24-04-2019</a:t>
+              <a:t>21-05-2019</a:t>
             </a:fld>
             <a:endParaRPr lang="en-IN"/>
           </a:p>
@@ -2160,7 +2170,7 @@
             <a:fld id="{8CA8C114-48A9-423B-993A-755139EE928F}" type="datetimeFigureOut">
               <a:rPr lang="en-IN" smtClean="0"/>
               <a:pPr/>
-              <a:t>24-04-2019</a:t>
+              <a:t>21-05-2019</a:t>
             </a:fld>
             <a:endParaRPr lang="en-IN"/>
           </a:p>
@@ -2261,7 +2271,7 @@
           </a:lstStyle>
           <a:p>
             <a:r>
-              <a:rPr lang="en-US" smtClean="0"/>
+              <a:rPr lang="en-US"/>
               <a:t>Click to edit Master title style</a:t>
             </a:r>
             <a:endParaRPr lang="en-US" dirty="0"/>
@@ -2318,35 +2328,35 @@
           <a:p>
             <a:pPr lvl="0"/>
             <a:r>
-              <a:rPr lang="en-US" smtClean="0"/>
+              <a:rPr lang="en-US"/>
               <a:t>Click to edit Master text styles</a:t>
             </a:r>
           </a:p>
           <a:p>
             <a:pPr lvl="1"/>
             <a:r>
-              <a:rPr lang="en-US" smtClean="0"/>
+              <a:rPr lang="en-US"/>
               <a:t>Second level</a:t>
             </a:r>
           </a:p>
           <a:p>
             <a:pPr lvl="2"/>
             <a:r>
-              <a:rPr lang="en-US" smtClean="0"/>
+              <a:rPr lang="en-US"/>
               <a:t>Third level</a:t>
             </a:r>
           </a:p>
           <a:p>
             <a:pPr lvl="3"/>
             <a:r>
-              <a:rPr lang="en-US" smtClean="0"/>
+              <a:rPr lang="en-US"/>
               <a:t>Fourth level</a:t>
             </a:r>
           </a:p>
           <a:p>
             <a:pPr lvl="4"/>
             <a:r>
-              <a:rPr lang="en-US" smtClean="0"/>
+              <a:rPr lang="en-US"/>
               <a:t>Fifth level</a:t>
             </a:r>
             <a:endParaRPr lang="en-US" dirty="0"/>
@@ -2412,7 +2422,7 @@
           <a:p>
             <a:pPr lvl="0"/>
             <a:r>
-              <a:rPr lang="en-US" smtClean="0"/>
+              <a:rPr lang="en-US"/>
               <a:t>Click to edit Master text styles</a:t>
             </a:r>
           </a:p>
@@ -2436,7 +2446,7 @@
             <a:fld id="{8CA8C114-48A9-423B-993A-755139EE928F}" type="datetimeFigureOut">
               <a:rPr lang="en-IN" smtClean="0"/>
               <a:pPr/>
-              <a:t>24-04-2019</a:t>
+              <a:t>21-05-2019</a:t>
             </a:fld>
             <a:endParaRPr lang="en-IN"/>
           </a:p>
@@ -2572,7 +2582,7 @@
           </a:lstStyle>
           <a:p>
             <a:r>
-              <a:rPr lang="en-US" smtClean="0"/>
+              <a:rPr lang="en-US"/>
               <a:t>Click to edit Master title style</a:t>
             </a:r>
             <a:endParaRPr lang="en-US" dirty="0"/>
@@ -2653,7 +2663,7 @@
           </a:lstStyle>
           <a:p>
             <a:r>
-              <a:rPr lang="en-US" smtClean="0"/>
+              <a:rPr lang="en-US"/>
               <a:t>Click icon to add picture</a:t>
             </a:r>
             <a:endParaRPr lang="en-US" dirty="0"/>
@@ -2719,7 +2729,7 @@
           <a:p>
             <a:pPr lvl="0"/>
             <a:r>
-              <a:rPr lang="en-US" smtClean="0"/>
+              <a:rPr lang="en-US"/>
               <a:t>Click to edit Master text styles</a:t>
             </a:r>
           </a:p>
@@ -2743,7 +2753,7 @@
             <a:fld id="{8CA8C114-48A9-423B-993A-755139EE928F}" type="datetimeFigureOut">
               <a:rPr lang="en-IN" smtClean="0"/>
               <a:pPr/>
-              <a:t>24-04-2019</a:t>
+              <a:t>21-05-2019</a:t>
             </a:fld>
             <a:endParaRPr lang="en-IN"/>
           </a:p>
@@ -2894,7 +2904,7 @@
           <a:lstStyle/>
           <a:p>
             <a:r>
-              <a:rPr lang="en-US" smtClean="0"/>
+              <a:rPr lang="en-US"/>
               <a:t>Click to edit Master title style</a:t>
             </a:r>
             <a:endParaRPr lang="en-US" dirty="0"/>
@@ -2928,35 +2938,35 @@
           <a:p>
             <a:pPr lvl="0"/>
             <a:r>
-              <a:rPr lang="en-US" smtClean="0"/>
+              <a:rPr lang="en-US"/>
               <a:t>Click to edit Master text styles</a:t>
             </a:r>
           </a:p>
           <a:p>
             <a:pPr lvl="1"/>
             <a:r>
-              <a:rPr lang="en-US" smtClean="0"/>
+              <a:rPr lang="en-US"/>
               <a:t>Second level</a:t>
             </a:r>
           </a:p>
           <a:p>
             <a:pPr lvl="2"/>
             <a:r>
-              <a:rPr lang="en-US" smtClean="0"/>
+              <a:rPr lang="en-US"/>
               <a:t>Third level</a:t>
             </a:r>
           </a:p>
           <a:p>
             <a:pPr lvl="3"/>
             <a:r>
-              <a:rPr lang="en-US" smtClean="0"/>
+              <a:rPr lang="en-US"/>
               <a:t>Fourth level</a:t>
             </a:r>
           </a:p>
           <a:p>
             <a:pPr lvl="4"/>
             <a:r>
-              <a:rPr lang="en-US" smtClean="0"/>
+              <a:rPr lang="en-US"/>
               <a:t>Fifth level</a:t>
             </a:r>
             <a:endParaRPr lang="en-US" dirty="0"/>
@@ -3043,7 +3053,7 @@
             <a:fld id="{8CA8C114-48A9-423B-993A-755139EE928F}" type="datetimeFigureOut">
               <a:rPr lang="en-IN" smtClean="0"/>
               <a:pPr/>
-              <a:t>24-04-2019</a:t>
+              <a:t>21-05-2019</a:t>
             </a:fld>
             <a:endParaRPr lang="en-IN"/>
           </a:p>
@@ -3457,10 +3467,9 @@
           <a:lstStyle/>
           <a:p>
             <a:r>
-              <a:rPr lang="en-IN" dirty="0" smtClean="0"/>
+              <a:rPr lang="en-IN" dirty="0"/>
               <a:t>Processor organization</a:t>
             </a:r>
-            <a:endParaRPr lang="en-IN" dirty="0"/>
           </a:p>
         </p:txBody>
       </p:sp>
@@ -3486,20 +3495,13 @@
     </p:spTree>
     <p:extLst>
       <p:ext uri="{BB962C8B-B14F-4D97-AF65-F5344CB8AC3E}">
-        <p14:creationId xmlns="" xmlns:p14="http://schemas.microsoft.com/office/powerpoint/2010/main" val="4070836522"/>
+        <p14:creationId xmlns:p14="http://schemas.microsoft.com/office/powerpoint/2010/main" val="4070836522"/>
       </p:ext>
     </p:extLst>
   </p:cSld>
   <p:clrMapOvr>
     <a:masterClrMapping/>
   </p:clrMapOvr>
-  <p:timing>
-    <p:tnLst>
-      <p:par>
-        <p:cTn id="1" dur="indefinite" restart="never" nodeType="tmRoot"/>
-      </p:par>
-    </p:tnLst>
-  </p:timing>
 </p:sld>
 </file>
 
@@ -3536,10 +3538,9 @@
           <a:lstStyle/>
           <a:p>
             <a:r>
-              <a:rPr lang="en-IN" dirty="0" smtClean="0"/>
+              <a:rPr lang="en-IN" dirty="0"/>
               <a:t>Design of arithmetic circuit</a:t>
             </a:r>
-            <a:endParaRPr lang="en-IN" dirty="0"/>
           </a:p>
         </p:txBody>
       </p:sp>
@@ -3559,10 +3560,9 @@
           <a:lstStyle/>
           <a:p>
             <a:r>
-              <a:rPr lang="en-IN" dirty="0" smtClean="0"/>
+              <a:rPr lang="en-IN" dirty="0"/>
               <a:t>Basic component – parallel adder</a:t>
             </a:r>
-            <a:endParaRPr lang="en-IN" dirty="0"/>
           </a:p>
         </p:txBody>
       </p:sp>
@@ -3578,7 +3578,7 @@
           <a:blip r:embed="rId2">
             <a:extLst>
               <a:ext uri="{28A0092B-C50C-407E-A947-70E740481C1C}">
-                <a14:useLocalDpi xmlns="" xmlns:a14="http://schemas.microsoft.com/office/drawing/2010/main" val="0"/>
+                <a14:useLocalDpi xmlns:a14="http://schemas.microsoft.com/office/drawing/2010/main" val="0"/>
               </a:ext>
             </a:extLst>
           </a:blip>
@@ -3601,14 +3601,14 @@
           </a:ln>
           <a:extLst>
             <a:ext uri="{909E8E84-426E-40DD-AFC4-6F175D3DCCD1}">
-              <a14:hiddenFill xmlns="" xmlns:a14="http://schemas.microsoft.com/office/drawing/2010/main">
+              <a14:hiddenFill xmlns:a14="http://schemas.microsoft.com/office/drawing/2010/main">
                 <a:solidFill>
                   <a:schemeClr val="accent1"/>
                 </a:solidFill>
               </a14:hiddenFill>
             </a:ext>
             <a:ext uri="{91240B29-F687-4F45-9708-019B960494DF}">
-              <a14:hiddenLine xmlns="" xmlns:a14="http://schemas.microsoft.com/office/drawing/2010/main" w="9525">
+              <a14:hiddenLine xmlns:a14="http://schemas.microsoft.com/office/drawing/2010/main" w="9525">
                 <a:solidFill>
                   <a:schemeClr val="tx1"/>
                 </a:solidFill>
@@ -3623,20 +3623,13 @@
     </p:spTree>
     <p:extLst>
       <p:ext uri="{BB962C8B-B14F-4D97-AF65-F5344CB8AC3E}">
-        <p14:creationId xmlns="" xmlns:p14="http://schemas.microsoft.com/office/powerpoint/2010/main" val="958562934"/>
+        <p14:creationId xmlns:p14="http://schemas.microsoft.com/office/powerpoint/2010/main" val="958562934"/>
       </p:ext>
     </p:extLst>
   </p:cSld>
   <p:clrMapOvr>
     <a:masterClrMapping/>
   </p:clrMapOvr>
-  <p:timing>
-    <p:tnLst>
-      <p:par>
-        <p:cTn id="1" dur="indefinite" restart="never" nodeType="tmRoot"/>
-      </p:par>
-    </p:tnLst>
-  </p:timing>
 </p:sld>
 </file>
 
@@ -3707,7 +3700,7 @@
           <a:blip r:embed="rId2">
             <a:extLst>
               <a:ext uri="{28A0092B-C50C-407E-A947-70E740481C1C}">
-                <a14:useLocalDpi xmlns="" xmlns:a14="http://schemas.microsoft.com/office/drawing/2010/main" val="0"/>
+                <a14:useLocalDpi xmlns:a14="http://schemas.microsoft.com/office/drawing/2010/main" val="0"/>
               </a:ext>
             </a:extLst>
           </a:blip>
@@ -3730,14 +3723,14 @@
           </a:ln>
           <a:extLst>
             <a:ext uri="{909E8E84-426E-40DD-AFC4-6F175D3DCCD1}">
-              <a14:hiddenFill xmlns="" xmlns:a14="http://schemas.microsoft.com/office/drawing/2010/main">
+              <a14:hiddenFill xmlns:a14="http://schemas.microsoft.com/office/drawing/2010/main">
                 <a:solidFill>
                   <a:schemeClr val="accent1"/>
                 </a:solidFill>
               </a14:hiddenFill>
             </a:ext>
             <a:ext uri="{91240B29-F687-4F45-9708-019B960494DF}">
-              <a14:hiddenLine xmlns="" xmlns:a14="http://schemas.microsoft.com/office/drawing/2010/main" w="9525">
+              <a14:hiddenLine xmlns:a14="http://schemas.microsoft.com/office/drawing/2010/main" w="9525">
                 <a:solidFill>
                   <a:schemeClr val="tx1"/>
                 </a:solidFill>
@@ -3752,20 +3745,13 @@
     </p:spTree>
     <p:extLst>
       <p:ext uri="{BB962C8B-B14F-4D97-AF65-F5344CB8AC3E}">
-        <p14:creationId xmlns="" xmlns:p14="http://schemas.microsoft.com/office/powerpoint/2010/main" val="2214494508"/>
+        <p14:creationId xmlns:p14="http://schemas.microsoft.com/office/powerpoint/2010/main" val="2214494508"/>
       </p:ext>
     </p:extLst>
   </p:cSld>
   <p:clrMapOvr>
     <a:masterClrMapping/>
   </p:clrMapOvr>
-  <p:timing>
-    <p:tnLst>
-      <p:par>
-        <p:cTn id="1" dur="indefinite" restart="never" nodeType="tmRoot"/>
-      </p:par>
-    </p:tnLst>
-  </p:timing>
 </p:sld>
 </file>
 
@@ -3836,7 +3822,7 @@
           <a:blip r:embed="rId2">
             <a:extLst>
               <a:ext uri="{28A0092B-C50C-407E-A947-70E740481C1C}">
-                <a14:useLocalDpi xmlns="" xmlns:a14="http://schemas.microsoft.com/office/drawing/2010/main" val="0"/>
+                <a14:useLocalDpi xmlns:a14="http://schemas.microsoft.com/office/drawing/2010/main" val="0"/>
               </a:ext>
             </a:extLst>
           </a:blip>
@@ -3859,14 +3845,14 @@
           </a:ln>
           <a:extLst>
             <a:ext uri="{909E8E84-426E-40DD-AFC4-6F175D3DCCD1}">
-              <a14:hiddenFill xmlns="" xmlns:a14="http://schemas.microsoft.com/office/drawing/2010/main">
+              <a14:hiddenFill xmlns:a14="http://schemas.microsoft.com/office/drawing/2010/main">
                 <a:solidFill>
                   <a:schemeClr val="accent1"/>
                 </a:solidFill>
               </a14:hiddenFill>
             </a:ext>
             <a:ext uri="{91240B29-F687-4F45-9708-019B960494DF}">
-              <a14:hiddenLine xmlns="" xmlns:a14="http://schemas.microsoft.com/office/drawing/2010/main" w="9525">
+              <a14:hiddenLine xmlns:a14="http://schemas.microsoft.com/office/drawing/2010/main" w="9525">
                 <a:solidFill>
                   <a:schemeClr val="tx1"/>
                 </a:solidFill>
@@ -3890,7 +3876,7 @@
           <a:blip r:embed="rId3">
             <a:extLst>
               <a:ext uri="{28A0092B-C50C-407E-A947-70E740481C1C}">
-                <a14:useLocalDpi xmlns="" xmlns:a14="http://schemas.microsoft.com/office/drawing/2010/main" val="0"/>
+                <a14:useLocalDpi xmlns:a14="http://schemas.microsoft.com/office/drawing/2010/main" val="0"/>
               </a:ext>
             </a:extLst>
           </a:blip>
@@ -3913,14 +3899,14 @@
           </a:ln>
           <a:extLst>
             <a:ext uri="{909E8E84-426E-40DD-AFC4-6F175D3DCCD1}">
-              <a14:hiddenFill xmlns="" xmlns:a14="http://schemas.microsoft.com/office/drawing/2010/main">
+              <a14:hiddenFill xmlns:a14="http://schemas.microsoft.com/office/drawing/2010/main">
                 <a:solidFill>
                   <a:schemeClr val="accent1"/>
                 </a:solidFill>
               </a14:hiddenFill>
             </a:ext>
             <a:ext uri="{91240B29-F687-4F45-9708-019B960494DF}">
-              <a14:hiddenLine xmlns="" xmlns:a14="http://schemas.microsoft.com/office/drawing/2010/main" w="9525">
+              <a14:hiddenLine xmlns:a14="http://schemas.microsoft.com/office/drawing/2010/main" w="9525">
                 <a:solidFill>
                   <a:schemeClr val="tx1"/>
                 </a:solidFill>
@@ -3944,7 +3930,7 @@
           <a:blip r:embed="rId4">
             <a:extLst>
               <a:ext uri="{28A0092B-C50C-407E-A947-70E740481C1C}">
-                <a14:useLocalDpi xmlns="" xmlns:a14="http://schemas.microsoft.com/office/drawing/2010/main" val="0"/>
+                <a14:useLocalDpi xmlns:a14="http://schemas.microsoft.com/office/drawing/2010/main" val="0"/>
               </a:ext>
             </a:extLst>
           </a:blip>
@@ -3967,14 +3953,14 @@
           </a:ln>
           <a:extLst>
             <a:ext uri="{909E8E84-426E-40DD-AFC4-6F175D3DCCD1}">
-              <a14:hiddenFill xmlns="" xmlns:a14="http://schemas.microsoft.com/office/drawing/2010/main">
+              <a14:hiddenFill xmlns:a14="http://schemas.microsoft.com/office/drawing/2010/main">
                 <a:solidFill>
                   <a:schemeClr val="accent1"/>
                 </a:solidFill>
               </a14:hiddenFill>
             </a:ext>
             <a:ext uri="{91240B29-F687-4F45-9708-019B960494DF}">
-              <a14:hiddenLine xmlns="" xmlns:a14="http://schemas.microsoft.com/office/drawing/2010/main" w="9525">
+              <a14:hiddenLine xmlns:a14="http://schemas.microsoft.com/office/drawing/2010/main" w="9525">
                 <a:solidFill>
                   <a:schemeClr val="tx1"/>
                 </a:solidFill>
@@ -3989,20 +3975,13 @@
     </p:spTree>
     <p:extLst>
       <p:ext uri="{BB962C8B-B14F-4D97-AF65-F5344CB8AC3E}">
-        <p14:creationId xmlns="" xmlns:p14="http://schemas.microsoft.com/office/powerpoint/2010/main" val="3253763957"/>
+        <p14:creationId xmlns:p14="http://schemas.microsoft.com/office/powerpoint/2010/main" val="3253763957"/>
       </p:ext>
     </p:extLst>
   </p:cSld>
   <p:clrMapOvr>
     <a:masterClrMapping/>
   </p:clrMapOvr>
-  <p:timing>
-    <p:tnLst>
-      <p:par>
-        <p:cTn id="1" dur="indefinite" restart="never" nodeType="tmRoot"/>
-      </p:par>
-    </p:tnLst>
-  </p:timing>
 </p:sld>
 </file>
 
@@ -4073,7 +4052,7 @@
           <a:blip r:embed="rId2">
             <a:extLst>
               <a:ext uri="{28A0092B-C50C-407E-A947-70E740481C1C}">
-                <a14:useLocalDpi xmlns="" xmlns:a14="http://schemas.microsoft.com/office/drawing/2010/main" val="0"/>
+                <a14:useLocalDpi xmlns:a14="http://schemas.microsoft.com/office/drawing/2010/main" val="0"/>
               </a:ext>
             </a:extLst>
           </a:blip>
@@ -4096,14 +4075,14 @@
           </a:ln>
           <a:extLst>
             <a:ext uri="{909E8E84-426E-40DD-AFC4-6F175D3DCCD1}">
-              <a14:hiddenFill xmlns="" xmlns:a14="http://schemas.microsoft.com/office/drawing/2010/main">
+              <a14:hiddenFill xmlns:a14="http://schemas.microsoft.com/office/drawing/2010/main">
                 <a:solidFill>
                   <a:schemeClr val="accent1"/>
                 </a:solidFill>
               </a14:hiddenFill>
             </a:ext>
             <a:ext uri="{91240B29-F687-4F45-9708-019B960494DF}">
-              <a14:hiddenLine xmlns="" xmlns:a14="http://schemas.microsoft.com/office/drawing/2010/main" w="9525">
+              <a14:hiddenLine xmlns:a14="http://schemas.microsoft.com/office/drawing/2010/main" w="9525">
                 <a:solidFill>
                   <a:schemeClr val="tx1"/>
                 </a:solidFill>
@@ -4118,20 +4097,13 @@
     </p:spTree>
     <p:extLst>
       <p:ext uri="{BB962C8B-B14F-4D97-AF65-F5344CB8AC3E}">
-        <p14:creationId xmlns="" xmlns:p14="http://schemas.microsoft.com/office/powerpoint/2010/main" val="3228193094"/>
+        <p14:creationId xmlns:p14="http://schemas.microsoft.com/office/powerpoint/2010/main" val="3228193094"/>
       </p:ext>
     </p:extLst>
   </p:cSld>
   <p:clrMapOvr>
     <a:masterClrMapping/>
   </p:clrMapOvr>
-  <p:timing>
-    <p:tnLst>
-      <p:par>
-        <p:cTn id="1" dur="indefinite" restart="never" nodeType="tmRoot"/>
-      </p:par>
-    </p:tnLst>
-  </p:timing>
 </p:sld>
 </file>
 
@@ -4202,7 +4174,7 @@
           <a:blip r:embed="rId2">
             <a:extLst>
               <a:ext uri="{28A0092B-C50C-407E-A947-70E740481C1C}">
-                <a14:useLocalDpi xmlns="" xmlns:a14="http://schemas.microsoft.com/office/drawing/2010/main" val="0"/>
+                <a14:useLocalDpi xmlns:a14="http://schemas.microsoft.com/office/drawing/2010/main" val="0"/>
               </a:ext>
             </a:extLst>
           </a:blip>
@@ -4225,14 +4197,14 @@
           </a:ln>
           <a:extLst>
             <a:ext uri="{909E8E84-426E-40DD-AFC4-6F175D3DCCD1}">
-              <a14:hiddenFill xmlns="" xmlns:a14="http://schemas.microsoft.com/office/drawing/2010/main">
+              <a14:hiddenFill xmlns:a14="http://schemas.microsoft.com/office/drawing/2010/main">
                 <a:solidFill>
                   <a:schemeClr val="accent1"/>
                 </a:solidFill>
               </a14:hiddenFill>
             </a:ext>
             <a:ext uri="{91240B29-F687-4F45-9708-019B960494DF}">
-              <a14:hiddenLine xmlns="" xmlns:a14="http://schemas.microsoft.com/office/drawing/2010/main" w="9525">
+              <a14:hiddenLine xmlns:a14="http://schemas.microsoft.com/office/drawing/2010/main" w="9525">
                 <a:solidFill>
                   <a:schemeClr val="tx1"/>
                 </a:solidFill>
@@ -4247,20 +4219,13 @@
     </p:spTree>
     <p:extLst>
       <p:ext uri="{BB962C8B-B14F-4D97-AF65-F5344CB8AC3E}">
-        <p14:creationId xmlns="" xmlns:p14="http://schemas.microsoft.com/office/powerpoint/2010/main" val="4033685471"/>
+        <p14:creationId xmlns:p14="http://schemas.microsoft.com/office/powerpoint/2010/main" val="4033685471"/>
       </p:ext>
     </p:extLst>
   </p:cSld>
   <p:clrMapOvr>
     <a:masterClrMapping/>
   </p:clrMapOvr>
-  <p:timing>
-    <p:tnLst>
-      <p:par>
-        <p:cTn id="1" dur="indefinite" restart="never" nodeType="tmRoot"/>
-      </p:par>
-    </p:tnLst>
-  </p:timing>
 </p:sld>
 </file>
 
@@ -4315,43 +4280,35 @@
           <a:bodyPr/>
           <a:lstStyle/>
           <a:p>
-            <a:endParaRPr lang="en-IN" dirty="0" smtClean="0"/>
-          </a:p>
-          <a:p>
             <a:endParaRPr lang="en-IN" dirty="0"/>
           </a:p>
           <a:p>
-            <a:endParaRPr lang="en-IN" dirty="0" smtClean="0"/>
-          </a:p>
-          <a:p>
             <a:endParaRPr lang="en-IN" dirty="0"/>
           </a:p>
           <a:p>
-            <a:r>
-              <a:rPr lang="en-IN" dirty="0" smtClean="0"/>
+            <a:endParaRPr lang="en-IN" dirty="0"/>
+          </a:p>
+          <a:p>
+            <a:endParaRPr lang="en-IN" dirty="0"/>
+          </a:p>
+          <a:p>
+            <a:r>
+              <a:rPr lang="en-IN" dirty="0"/>
               <a:t>What will be the effect on output carry in the circuit?</a:t>
             </a:r>
-            <a:endParaRPr lang="en-IN" dirty="0"/>
           </a:p>
         </p:txBody>
       </p:sp>
     </p:spTree>
     <p:extLst>
       <p:ext uri="{BB962C8B-B14F-4D97-AF65-F5344CB8AC3E}">
-        <p14:creationId xmlns="" xmlns:p14="http://schemas.microsoft.com/office/powerpoint/2010/main" val="2898650143"/>
+        <p14:creationId xmlns:p14="http://schemas.microsoft.com/office/powerpoint/2010/main" val="2898650143"/>
       </p:ext>
     </p:extLst>
   </p:cSld>
   <p:clrMapOvr>
     <a:masterClrMapping/>
   </p:clrMapOvr>
-  <p:timing>
-    <p:tnLst>
-      <p:par>
-        <p:cTn id="1" dur="indefinite" restart="never" nodeType="tmRoot"/>
-      </p:par>
-    </p:tnLst>
-  </p:timing>
 </p:sld>
 </file>
 
@@ -4388,10 +4345,9 @@
           <a:lstStyle/>
           <a:p>
             <a:r>
-              <a:rPr lang="en-US" dirty="0" smtClean="0"/>
+              <a:rPr lang="en-US" dirty="0"/>
               <a:t>Other Arithmetic Circuits</a:t>
             </a:r>
-            <a:endParaRPr lang="en-US" dirty="0"/>
           </a:p>
         </p:txBody>
       </p:sp>
@@ -4550,10 +4506,9 @@
           <a:lstStyle/>
           <a:p>
             <a:r>
-              <a:rPr lang="en-US" dirty="0" smtClean="0"/>
+              <a:rPr lang="en-US" dirty="0"/>
               <a:t>Design of Example</a:t>
             </a:r>
-            <a:endParaRPr lang="en-US" dirty="0"/>
           </a:p>
         </p:txBody>
       </p:sp>
@@ -4633,10 +4588,9 @@
           <a:lstStyle/>
           <a:p>
             <a:r>
-              <a:rPr lang="en-IN" dirty="0" smtClean="0"/>
+              <a:rPr lang="en-IN" dirty="0"/>
               <a:t>Design of logic circuit</a:t>
             </a:r>
-            <a:endParaRPr lang="en-IN" dirty="0"/>
           </a:p>
         </p:txBody>
       </p:sp>
@@ -4671,7 +4625,7 @@
           <a:blip r:embed="rId2">
             <a:extLst>
               <a:ext uri="{28A0092B-C50C-407E-A947-70E740481C1C}">
-                <a14:useLocalDpi xmlns="" xmlns:a14="http://schemas.microsoft.com/office/drawing/2010/main" val="0"/>
+                <a14:useLocalDpi xmlns:a14="http://schemas.microsoft.com/office/drawing/2010/main" val="0"/>
               </a:ext>
             </a:extLst>
           </a:blip>
@@ -4694,14 +4648,14 @@
           </a:ln>
           <a:extLst>
             <a:ext uri="{909E8E84-426E-40DD-AFC4-6F175D3DCCD1}">
-              <a14:hiddenFill xmlns="" xmlns:a14="http://schemas.microsoft.com/office/drawing/2010/main">
+              <a14:hiddenFill xmlns:a14="http://schemas.microsoft.com/office/drawing/2010/main">
                 <a:solidFill>
                   <a:schemeClr val="accent1"/>
                 </a:solidFill>
               </a14:hiddenFill>
             </a:ext>
             <a:ext uri="{91240B29-F687-4F45-9708-019B960494DF}">
-              <a14:hiddenLine xmlns="" xmlns:a14="http://schemas.microsoft.com/office/drawing/2010/main" w="9525">
+              <a14:hiddenLine xmlns:a14="http://schemas.microsoft.com/office/drawing/2010/main" w="9525">
                 <a:solidFill>
                   <a:schemeClr val="tx1"/>
                 </a:solidFill>
@@ -4716,20 +4670,13 @@
     </p:spTree>
     <p:extLst>
       <p:ext uri="{BB962C8B-B14F-4D97-AF65-F5344CB8AC3E}">
-        <p14:creationId xmlns="" xmlns:p14="http://schemas.microsoft.com/office/powerpoint/2010/main" val="2988081854"/>
+        <p14:creationId xmlns:p14="http://schemas.microsoft.com/office/powerpoint/2010/main" val="2988081854"/>
       </p:ext>
     </p:extLst>
   </p:cSld>
   <p:clrMapOvr>
     <a:masterClrMapping/>
   </p:clrMapOvr>
-  <p:timing>
-    <p:tnLst>
-      <p:par>
-        <p:cTn id="1" dur="indefinite" restart="never" nodeType="tmRoot"/>
-      </p:par>
-    </p:tnLst>
-  </p:timing>
 </p:sld>
 </file>
 
@@ -4771,10 +4718,9 @@
           <a:lstStyle/>
           <a:p>
             <a:r>
-              <a:rPr lang="en-IN" dirty="0" smtClean="0"/>
+              <a:rPr lang="en-IN" dirty="0"/>
               <a:t>Processor organization</a:t>
             </a:r>
-            <a:endParaRPr lang="en-IN" dirty="0"/>
           </a:p>
         </p:txBody>
       </p:sp>
@@ -4809,7 +4755,7 @@
           <a:blip r:embed="rId2">
             <a:extLst>
               <a:ext uri="{28A0092B-C50C-407E-A947-70E740481C1C}">
-                <a14:useLocalDpi xmlns="" xmlns:a14="http://schemas.microsoft.com/office/drawing/2010/main" val="0"/>
+                <a14:useLocalDpi xmlns:a14="http://schemas.microsoft.com/office/drawing/2010/main" val="0"/>
               </a:ext>
             </a:extLst>
           </a:blip>
@@ -4832,14 +4778,14 @@
           </a:ln>
           <a:extLst>
             <a:ext uri="{909E8E84-426E-40DD-AFC4-6F175D3DCCD1}">
-              <a14:hiddenFill xmlns="" xmlns:a14="http://schemas.microsoft.com/office/drawing/2010/main">
+              <a14:hiddenFill xmlns:a14="http://schemas.microsoft.com/office/drawing/2010/main">
                 <a:solidFill>
                   <a:schemeClr val="accent1"/>
                 </a:solidFill>
               </a14:hiddenFill>
             </a:ext>
             <a:ext uri="{91240B29-F687-4F45-9708-019B960494DF}">
-              <a14:hiddenLine xmlns="" xmlns:a14="http://schemas.microsoft.com/office/drawing/2010/main" w="9525">
+              <a14:hiddenLine xmlns:a14="http://schemas.microsoft.com/office/drawing/2010/main" w="9525">
                 <a:solidFill>
                   <a:schemeClr val="tx1"/>
                 </a:solidFill>
@@ -4854,7 +4800,7 @@
     </p:spTree>
     <p:extLst>
       <p:ext uri="{BB962C8B-B14F-4D97-AF65-F5344CB8AC3E}">
-        <p14:creationId xmlns="" xmlns:p14="http://schemas.microsoft.com/office/powerpoint/2010/main" val="2486756224"/>
+        <p14:creationId xmlns:p14="http://schemas.microsoft.com/office/powerpoint/2010/main" val="2486756224"/>
       </p:ext>
     </p:extLst>
   </p:cSld>
@@ -4897,10 +4843,9 @@
           <a:lstStyle/>
           <a:p>
             <a:r>
-              <a:rPr lang="en-IN" dirty="0" smtClean="0"/>
+              <a:rPr lang="en-IN" dirty="0"/>
               <a:t>Combining arithmetic and logic units</a:t>
             </a:r>
-            <a:endParaRPr lang="en-IN" dirty="0"/>
           </a:p>
         </p:txBody>
       </p:sp>
@@ -4935,7 +4880,7 @@
           <a:blip r:embed="rId2">
             <a:extLst>
               <a:ext uri="{28A0092B-C50C-407E-A947-70E740481C1C}">
-                <a14:useLocalDpi xmlns="" xmlns:a14="http://schemas.microsoft.com/office/drawing/2010/main" val="0"/>
+                <a14:useLocalDpi xmlns:a14="http://schemas.microsoft.com/office/drawing/2010/main" val="0"/>
               </a:ext>
             </a:extLst>
           </a:blip>
@@ -4958,14 +4903,14 @@
           </a:ln>
           <a:extLst>
             <a:ext uri="{909E8E84-426E-40DD-AFC4-6F175D3DCCD1}">
-              <a14:hiddenFill xmlns="" xmlns:a14="http://schemas.microsoft.com/office/drawing/2010/main">
+              <a14:hiddenFill xmlns:a14="http://schemas.microsoft.com/office/drawing/2010/main">
                 <a:solidFill>
                   <a:schemeClr val="accent1"/>
                 </a:solidFill>
               </a14:hiddenFill>
             </a:ext>
             <a:ext uri="{91240B29-F687-4F45-9708-019B960494DF}">
-              <a14:hiddenLine xmlns="" xmlns:a14="http://schemas.microsoft.com/office/drawing/2010/main" w="9525">
+              <a14:hiddenLine xmlns:a14="http://schemas.microsoft.com/office/drawing/2010/main" w="9525">
                 <a:solidFill>
                   <a:schemeClr val="tx1"/>
                 </a:solidFill>
@@ -4980,20 +4925,13 @@
     </p:spTree>
     <p:extLst>
       <p:ext uri="{BB962C8B-B14F-4D97-AF65-F5344CB8AC3E}">
-        <p14:creationId xmlns="" xmlns:p14="http://schemas.microsoft.com/office/powerpoint/2010/main" val="4095701016"/>
+        <p14:creationId xmlns:p14="http://schemas.microsoft.com/office/powerpoint/2010/main" val="4095701016"/>
       </p:ext>
     </p:extLst>
   </p:cSld>
   <p:clrMapOvr>
     <a:masterClrMapping/>
   </p:clrMapOvr>
-  <p:timing>
-    <p:tnLst>
-      <p:par>
-        <p:cTn id="1" dur="indefinite" restart="never" nodeType="tmRoot"/>
-      </p:par>
-    </p:tnLst>
-  </p:timing>
 </p:sld>
 </file>
 
@@ -5064,7 +5002,7 @@
           <a:blip r:embed="rId2">
             <a:extLst>
               <a:ext uri="{28A0092B-C50C-407E-A947-70E740481C1C}">
-                <a14:useLocalDpi xmlns="" xmlns:a14="http://schemas.microsoft.com/office/drawing/2010/main" val="0"/>
+                <a14:useLocalDpi xmlns:a14="http://schemas.microsoft.com/office/drawing/2010/main" val="0"/>
               </a:ext>
             </a:extLst>
           </a:blip>
@@ -5087,14 +5025,14 @@
           </a:ln>
           <a:extLst>
             <a:ext uri="{909E8E84-426E-40DD-AFC4-6F175D3DCCD1}">
-              <a14:hiddenFill xmlns="" xmlns:a14="http://schemas.microsoft.com/office/drawing/2010/main">
+              <a14:hiddenFill xmlns:a14="http://schemas.microsoft.com/office/drawing/2010/main">
                 <a:solidFill>
                   <a:schemeClr val="accent1"/>
                 </a:solidFill>
               </a14:hiddenFill>
             </a:ext>
             <a:ext uri="{91240B29-F687-4F45-9708-019B960494DF}">
-              <a14:hiddenLine xmlns="" xmlns:a14="http://schemas.microsoft.com/office/drawing/2010/main" w="9525">
+              <a14:hiddenLine xmlns:a14="http://schemas.microsoft.com/office/drawing/2010/main" w="9525">
                 <a:solidFill>
                   <a:schemeClr val="tx1"/>
                 </a:solidFill>
@@ -5118,7 +5056,7 @@
           <a:blip r:embed="rId3">
             <a:extLst>
               <a:ext uri="{28A0092B-C50C-407E-A947-70E740481C1C}">
-                <a14:useLocalDpi xmlns="" xmlns:a14="http://schemas.microsoft.com/office/drawing/2010/main" val="0"/>
+                <a14:useLocalDpi xmlns:a14="http://schemas.microsoft.com/office/drawing/2010/main" val="0"/>
               </a:ext>
             </a:extLst>
           </a:blip>
@@ -5141,14 +5079,14 @@
           </a:ln>
           <a:extLst>
             <a:ext uri="{909E8E84-426E-40DD-AFC4-6F175D3DCCD1}">
-              <a14:hiddenFill xmlns="" xmlns:a14="http://schemas.microsoft.com/office/drawing/2010/main">
+              <a14:hiddenFill xmlns:a14="http://schemas.microsoft.com/office/drawing/2010/main">
                 <a:solidFill>
                   <a:schemeClr val="accent1"/>
                 </a:solidFill>
               </a14:hiddenFill>
             </a:ext>
             <a:ext uri="{91240B29-F687-4F45-9708-019B960494DF}">
-              <a14:hiddenLine xmlns="" xmlns:a14="http://schemas.microsoft.com/office/drawing/2010/main" w="9525">
+              <a14:hiddenLine xmlns:a14="http://schemas.microsoft.com/office/drawing/2010/main" w="9525">
                 <a:solidFill>
                   <a:schemeClr val="tx1"/>
                 </a:solidFill>
@@ -5163,20 +5101,13 @@
     </p:spTree>
     <p:extLst>
       <p:ext uri="{BB962C8B-B14F-4D97-AF65-F5344CB8AC3E}">
-        <p14:creationId xmlns="" xmlns:p14="http://schemas.microsoft.com/office/powerpoint/2010/main" val="1338196587"/>
+        <p14:creationId xmlns:p14="http://schemas.microsoft.com/office/powerpoint/2010/main" val="1338196587"/>
       </p:ext>
     </p:extLst>
   </p:cSld>
   <p:clrMapOvr>
     <a:masterClrMapping/>
   </p:clrMapOvr>
-  <p:timing>
-    <p:tnLst>
-      <p:par>
-        <p:cTn id="1" dur="indefinite" restart="never" nodeType="tmRoot"/>
-      </p:par>
-    </p:tnLst>
-  </p:timing>
 </p:sld>
 </file>
 
@@ -5247,7 +5178,7 @@
           <a:blip r:embed="rId2">
             <a:extLst>
               <a:ext uri="{28A0092B-C50C-407E-A947-70E740481C1C}">
-                <a14:useLocalDpi xmlns="" xmlns:a14="http://schemas.microsoft.com/office/drawing/2010/main" val="0"/>
+                <a14:useLocalDpi xmlns:a14="http://schemas.microsoft.com/office/drawing/2010/main" val="0"/>
               </a:ext>
             </a:extLst>
           </a:blip>
@@ -5270,14 +5201,14 @@
           </a:ln>
           <a:extLst>
             <a:ext uri="{909E8E84-426E-40DD-AFC4-6F175D3DCCD1}">
-              <a14:hiddenFill xmlns="" xmlns:a14="http://schemas.microsoft.com/office/drawing/2010/main">
+              <a14:hiddenFill xmlns:a14="http://schemas.microsoft.com/office/drawing/2010/main">
                 <a:solidFill>
                   <a:schemeClr val="accent1"/>
                 </a:solidFill>
               </a14:hiddenFill>
             </a:ext>
             <a:ext uri="{91240B29-F687-4F45-9708-019B960494DF}">
-              <a14:hiddenLine xmlns="" xmlns:a14="http://schemas.microsoft.com/office/drawing/2010/main" w="9525">
+              <a14:hiddenLine xmlns:a14="http://schemas.microsoft.com/office/drawing/2010/main" w="9525">
                 <a:solidFill>
                   <a:schemeClr val="tx1"/>
                 </a:solidFill>
@@ -5292,20 +5223,13 @@
     </p:spTree>
     <p:extLst>
       <p:ext uri="{BB962C8B-B14F-4D97-AF65-F5344CB8AC3E}">
-        <p14:creationId xmlns="" xmlns:p14="http://schemas.microsoft.com/office/powerpoint/2010/main" val="2090551411"/>
+        <p14:creationId xmlns:p14="http://schemas.microsoft.com/office/powerpoint/2010/main" val="2090551411"/>
       </p:ext>
     </p:extLst>
   </p:cSld>
   <p:clrMapOvr>
     <a:masterClrMapping/>
   </p:clrMapOvr>
-  <p:timing>
-    <p:tnLst>
-      <p:par>
-        <p:cTn id="1" dur="indefinite" restart="never" nodeType="tmRoot"/>
-      </p:par>
-    </p:tnLst>
-  </p:timing>
 </p:sld>
 </file>
 
@@ -5349,10 +5273,9 @@
           <a:lstStyle/>
           <a:p>
             <a:r>
-              <a:rPr lang="en-IN" dirty="0" smtClean="0"/>
+              <a:rPr lang="en-IN" dirty="0"/>
               <a:t>Logic diagram of ALU</a:t>
             </a:r>
-            <a:endParaRPr lang="en-IN" dirty="0"/>
           </a:p>
         </p:txBody>
       </p:sp>
@@ -5387,7 +5310,7 @@
           <a:blip r:embed="rId2">
             <a:extLst>
               <a:ext uri="{28A0092B-C50C-407E-A947-70E740481C1C}">
-                <a14:useLocalDpi xmlns="" xmlns:a14="http://schemas.microsoft.com/office/drawing/2010/main" val="0"/>
+                <a14:useLocalDpi xmlns:a14="http://schemas.microsoft.com/office/drawing/2010/main" val="0"/>
               </a:ext>
             </a:extLst>
           </a:blip>
@@ -5410,14 +5333,14 @@
           </a:ln>
           <a:extLst>
             <a:ext uri="{909E8E84-426E-40DD-AFC4-6F175D3DCCD1}">
-              <a14:hiddenFill xmlns="" xmlns:a14="http://schemas.microsoft.com/office/drawing/2010/main">
+              <a14:hiddenFill xmlns:a14="http://schemas.microsoft.com/office/drawing/2010/main">
                 <a:solidFill>
                   <a:schemeClr val="accent1"/>
                 </a:solidFill>
               </a14:hiddenFill>
             </a:ext>
             <a:ext uri="{91240B29-F687-4F45-9708-019B960494DF}">
-              <a14:hiddenLine xmlns="" xmlns:a14="http://schemas.microsoft.com/office/drawing/2010/main" w="9525">
+              <a14:hiddenLine xmlns:a14="http://schemas.microsoft.com/office/drawing/2010/main" w="9525">
                 <a:solidFill>
                   <a:schemeClr val="tx1"/>
                 </a:solidFill>
@@ -5432,20 +5355,13 @@
     </p:spTree>
     <p:extLst>
       <p:ext uri="{BB962C8B-B14F-4D97-AF65-F5344CB8AC3E}">
-        <p14:creationId xmlns="" xmlns:p14="http://schemas.microsoft.com/office/powerpoint/2010/main" val="1239342461"/>
+        <p14:creationId xmlns:p14="http://schemas.microsoft.com/office/powerpoint/2010/main" val="1239342461"/>
       </p:ext>
     </p:extLst>
   </p:cSld>
   <p:clrMapOvr>
     <a:masterClrMapping/>
   </p:clrMapOvr>
-  <p:timing>
-    <p:tnLst>
-      <p:par>
-        <p:cTn id="1" dur="indefinite" restart="never" nodeType="tmRoot"/>
-      </p:par>
-    </p:tnLst>
-  </p:timing>
 </p:sld>
 </file>
 
@@ -5516,7 +5432,7 @@
           <a:blip r:embed="rId2">
             <a:extLst>
               <a:ext uri="{28A0092B-C50C-407E-A947-70E740481C1C}">
-                <a14:useLocalDpi xmlns="" xmlns:a14="http://schemas.microsoft.com/office/drawing/2010/main" val="0"/>
+                <a14:useLocalDpi xmlns:a14="http://schemas.microsoft.com/office/drawing/2010/main" val="0"/>
               </a:ext>
             </a:extLst>
           </a:blip>
@@ -5539,14 +5455,14 @@
           </a:ln>
           <a:extLst>
             <a:ext uri="{909E8E84-426E-40DD-AFC4-6F175D3DCCD1}">
-              <a14:hiddenFill xmlns="" xmlns:a14="http://schemas.microsoft.com/office/drawing/2010/main">
+              <a14:hiddenFill xmlns:a14="http://schemas.microsoft.com/office/drawing/2010/main">
                 <a:solidFill>
                   <a:schemeClr val="accent1"/>
                 </a:solidFill>
               </a14:hiddenFill>
             </a:ext>
             <a:ext uri="{91240B29-F687-4F45-9708-019B960494DF}">
-              <a14:hiddenLine xmlns="" xmlns:a14="http://schemas.microsoft.com/office/drawing/2010/main" w="9525">
+              <a14:hiddenLine xmlns:a14="http://schemas.microsoft.com/office/drawing/2010/main" w="9525">
                 <a:solidFill>
                   <a:schemeClr val="tx1"/>
                 </a:solidFill>
@@ -5561,20 +5477,13 @@
     </p:spTree>
     <p:extLst>
       <p:ext uri="{BB962C8B-B14F-4D97-AF65-F5344CB8AC3E}">
-        <p14:creationId xmlns="" xmlns:p14="http://schemas.microsoft.com/office/powerpoint/2010/main" val="271601470"/>
+        <p14:creationId xmlns:p14="http://schemas.microsoft.com/office/powerpoint/2010/main" val="271601470"/>
       </p:ext>
     </p:extLst>
   </p:cSld>
   <p:clrMapOvr>
     <a:masterClrMapping/>
   </p:clrMapOvr>
-  <p:timing>
-    <p:tnLst>
-      <p:par>
-        <p:cTn id="1" dur="indefinite" restart="never" nodeType="tmRoot"/>
-      </p:par>
-    </p:tnLst>
-  </p:timing>
 </p:sld>
 </file>
 
@@ -5611,72 +5520,71 @@
           <a:lstStyle/>
           <a:p>
             <a:r>
-              <a:rPr lang="en-IN" dirty="0" smtClean="0"/>
+              <a:rPr lang="en-IN" dirty="0"/>
               <a:t>STATUS REGISTER</a:t>
             </a:r>
+          </a:p>
+        </p:txBody>
+      </p:sp>
+      <p:sp>
+        <p:nvSpPr>
+          <p:cNvPr id="3" name="Content Placeholder 2"/>
+          <p:cNvSpPr>
+            <a:spLocks noGrp="1"/>
+          </p:cNvSpPr>
+          <p:nvPr>
+            <p:ph idx="1"/>
+          </p:nvPr>
+        </p:nvSpPr>
+        <p:spPr/>
+        <p:txBody>
+          <a:bodyPr/>
+          <a:lstStyle/>
+          <a:p>
+            <a:r>
+              <a:rPr lang="en-IN" dirty="0"/>
+              <a:t>Condition code/flag- C,S,Z,V</a:t>
+            </a:r>
+          </a:p>
+          <a:p>
             <a:endParaRPr lang="en-IN" dirty="0"/>
           </a:p>
-        </p:txBody>
-      </p:sp>
-      <p:sp>
-        <p:nvSpPr>
-          <p:cNvPr id="3" name="Content Placeholder 2"/>
-          <p:cNvSpPr>
-            <a:spLocks noGrp="1"/>
-          </p:cNvSpPr>
-          <p:nvPr>
-            <p:ph idx="1"/>
-          </p:nvPr>
-        </p:nvSpPr>
-        <p:spPr/>
-        <p:txBody>
-          <a:bodyPr/>
-          <a:lstStyle/>
-          <a:p>
-            <a:r>
-              <a:rPr lang="en-IN" dirty="0" smtClean="0"/>
-              <a:t>Condition code/flag- C,S,Z,V</a:t>
-            </a:r>
-          </a:p>
-          <a:p>
+          <a:p>
+            <a:r>
+              <a:rPr lang="en-IN" dirty="0"/>
+              <a:t>C(carry flag): set if output carry is 1</a:t>
+            </a:r>
+          </a:p>
+          <a:p>
+            <a:pPr lvl="1"/>
             <a:endParaRPr lang="en-IN" dirty="0"/>
           </a:p>
           <a:p>
             <a:r>
-              <a:rPr lang="en-IN" dirty="0" smtClean="0"/>
-              <a:t>C(carry flag): set if output carry is 1</a:t>
+              <a:rPr lang="en-IN" dirty="0"/>
+              <a:t>S(Sign flag): set if highest order bit is 1</a:t>
             </a:r>
           </a:p>
           <a:p>
             <a:pPr lvl="1"/>
-            <a:endParaRPr lang="en-IN" dirty="0" smtClean="0"/>
-          </a:p>
-          <a:p>
-            <a:r>
-              <a:rPr lang="en-IN" dirty="0" smtClean="0"/>
-              <a:t>S(Sign flag): set if highest order bit is 1</a:t>
+            <a:endParaRPr lang="en-IN" dirty="0"/>
+          </a:p>
+          <a:p>
+            <a:r>
+              <a:rPr lang="en-IN" dirty="0"/>
+              <a:t>Z(Zero flag): set if output has all 1’s</a:t>
             </a:r>
           </a:p>
           <a:p>
             <a:pPr lvl="1"/>
-            <a:endParaRPr lang="en-IN" dirty="0" smtClean="0"/>
-          </a:p>
-          <a:p>
-            <a:r>
-              <a:rPr lang="en-IN" dirty="0" smtClean="0"/>
-              <a:t>Z(Zero flag): set if output has all 1’s</a:t>
-            </a:r>
-          </a:p>
-          <a:p>
-            <a:pPr lvl="1"/>
-            <a:r>
-              <a:rPr lang="en-IN" dirty="0" smtClean="0"/>
+            <a:r>
+              <a:rPr lang="en-IN" dirty="0"/>
               <a:t>If set after XOR, A,B same</a:t>
             </a:r>
           </a:p>
           <a:p>
             <a:r>
-              <a:rPr lang="en-IN" dirty="0" smtClean="0"/>
+              <a:rPr lang="en-IN" dirty="0"/>
               <a:t>V(Overflow): set if there is overflow</a:t>
             </a:r>
           </a:p>
@@ -5691,7 +5599,7 @@
     </p:spTree>
     <p:extLst>
       <p:ext uri="{BB962C8B-B14F-4D97-AF65-F5344CB8AC3E}">
-        <p14:creationId xmlns="" xmlns:p14="http://schemas.microsoft.com/office/powerpoint/2010/main" val="3449448990"/>
+        <p14:creationId xmlns:p14="http://schemas.microsoft.com/office/powerpoint/2010/main" val="3449448990"/>
       </p:ext>
     </p:extLst>
   </p:cSld>
@@ -5768,7 +5676,7 @@
           <a:blip r:embed="rId2">
             <a:extLst>
               <a:ext uri="{28A0092B-C50C-407E-A947-70E740481C1C}">
-                <a14:useLocalDpi xmlns="" xmlns:a14="http://schemas.microsoft.com/office/drawing/2010/main" val="0"/>
+                <a14:useLocalDpi xmlns:a14="http://schemas.microsoft.com/office/drawing/2010/main" val="0"/>
               </a:ext>
             </a:extLst>
           </a:blip>
@@ -5791,14 +5699,14 @@
           </a:ln>
           <a:extLst>
             <a:ext uri="{909E8E84-426E-40DD-AFC4-6F175D3DCCD1}">
-              <a14:hiddenFill xmlns="" xmlns:a14="http://schemas.microsoft.com/office/drawing/2010/main">
+              <a14:hiddenFill xmlns:a14="http://schemas.microsoft.com/office/drawing/2010/main">
                 <a:solidFill>
                   <a:schemeClr val="accent1"/>
                 </a:solidFill>
               </a14:hiddenFill>
             </a:ext>
             <a:ext uri="{91240B29-F687-4F45-9708-019B960494DF}">
-              <a14:hiddenLine xmlns="" xmlns:a14="http://schemas.microsoft.com/office/drawing/2010/main" w="9525">
+              <a14:hiddenLine xmlns:a14="http://schemas.microsoft.com/office/drawing/2010/main" w="9525">
                 <a:solidFill>
                   <a:schemeClr val="tx1"/>
                 </a:solidFill>
@@ -5813,7 +5721,7 @@
     </p:spTree>
     <p:extLst>
       <p:ext uri="{BB962C8B-B14F-4D97-AF65-F5344CB8AC3E}">
-        <p14:creationId xmlns="" xmlns:p14="http://schemas.microsoft.com/office/powerpoint/2010/main" val="4192216107"/>
+        <p14:creationId xmlns:p14="http://schemas.microsoft.com/office/powerpoint/2010/main" val="4192216107"/>
       </p:ext>
     </p:extLst>
   </p:cSld>
@@ -5856,10 +5764,9 @@
           <a:lstStyle/>
           <a:p>
             <a:r>
-              <a:rPr lang="en-US" dirty="0" smtClean="0"/>
+              <a:rPr lang="en-US" dirty="0"/>
               <a:t>Status Register</a:t>
             </a:r>
-            <a:endParaRPr lang="en-US" dirty="0"/>
           </a:p>
         </p:txBody>
       </p:sp>
@@ -5939,10 +5846,9 @@
           <a:lstStyle/>
           <a:p>
             <a:r>
-              <a:rPr lang="en-US" dirty="0" smtClean="0"/>
+              <a:rPr lang="en-US" dirty="0"/>
               <a:t>Status Register</a:t>
             </a:r>
-            <a:endParaRPr lang="en-US" dirty="0"/>
           </a:p>
         </p:txBody>
       </p:sp>
@@ -6022,10 +5928,9 @@
           <a:lstStyle/>
           <a:p>
             <a:r>
-              <a:rPr lang="en-IN" dirty="0" smtClean="0"/>
+              <a:rPr lang="en-IN" dirty="0"/>
               <a:t>Shifter</a:t>
             </a:r>
-            <a:endParaRPr lang="en-IN" dirty="0"/>
           </a:p>
         </p:txBody>
       </p:sp>
@@ -6060,7 +5965,7 @@
           <a:blip r:embed="rId2">
             <a:extLst>
               <a:ext uri="{28A0092B-C50C-407E-A947-70E740481C1C}">
-                <a14:useLocalDpi xmlns="" xmlns:a14="http://schemas.microsoft.com/office/drawing/2010/main" val="0"/>
+                <a14:useLocalDpi xmlns:a14="http://schemas.microsoft.com/office/drawing/2010/main" val="0"/>
               </a:ext>
             </a:extLst>
           </a:blip>
@@ -6083,14 +5988,14 @@
           </a:ln>
           <a:extLst>
             <a:ext uri="{909E8E84-426E-40DD-AFC4-6F175D3DCCD1}">
-              <a14:hiddenFill xmlns="" xmlns:a14="http://schemas.microsoft.com/office/drawing/2010/main">
+              <a14:hiddenFill xmlns:a14="http://schemas.microsoft.com/office/drawing/2010/main">
                 <a:solidFill>
                   <a:schemeClr val="accent1"/>
                 </a:solidFill>
               </a14:hiddenFill>
             </a:ext>
             <a:ext uri="{91240B29-F687-4F45-9708-019B960494DF}">
-              <a14:hiddenLine xmlns="" xmlns:a14="http://schemas.microsoft.com/office/drawing/2010/main" w="9525">
+              <a14:hiddenLine xmlns:a14="http://schemas.microsoft.com/office/drawing/2010/main" w="9525">
                 <a:solidFill>
                   <a:schemeClr val="tx1"/>
                 </a:solidFill>
@@ -6114,7 +6019,7 @@
           <a:blip r:embed="rId3">
             <a:extLst>
               <a:ext uri="{28A0092B-C50C-407E-A947-70E740481C1C}">
-                <a14:useLocalDpi xmlns="" xmlns:a14="http://schemas.microsoft.com/office/drawing/2010/main" val="0"/>
+                <a14:useLocalDpi xmlns:a14="http://schemas.microsoft.com/office/drawing/2010/main" val="0"/>
               </a:ext>
             </a:extLst>
           </a:blip>
@@ -6137,14 +6042,14 @@
           </a:ln>
           <a:extLst>
             <a:ext uri="{909E8E84-426E-40DD-AFC4-6F175D3DCCD1}">
-              <a14:hiddenFill xmlns="" xmlns:a14="http://schemas.microsoft.com/office/drawing/2010/main">
+              <a14:hiddenFill xmlns:a14="http://schemas.microsoft.com/office/drawing/2010/main">
                 <a:solidFill>
                   <a:schemeClr val="accent1"/>
                 </a:solidFill>
               </a14:hiddenFill>
             </a:ext>
             <a:ext uri="{91240B29-F687-4F45-9708-019B960494DF}">
-              <a14:hiddenLine xmlns="" xmlns:a14="http://schemas.microsoft.com/office/drawing/2010/main" w="9525">
+              <a14:hiddenLine xmlns:a14="http://schemas.microsoft.com/office/drawing/2010/main" w="9525">
                 <a:solidFill>
                   <a:schemeClr val="tx1"/>
                 </a:solidFill>
@@ -6159,7 +6064,7 @@
     </p:spTree>
     <p:extLst>
       <p:ext uri="{BB962C8B-B14F-4D97-AF65-F5344CB8AC3E}">
-        <p14:creationId xmlns="" xmlns:p14="http://schemas.microsoft.com/office/powerpoint/2010/main" val="1057528887"/>
+        <p14:creationId xmlns:p14="http://schemas.microsoft.com/office/powerpoint/2010/main" val="1057528887"/>
       </p:ext>
     </p:extLst>
   </p:cSld>
@@ -6298,10 +6203,9 @@
           <a:lstStyle/>
           <a:p>
             <a:r>
-              <a:rPr lang="en-IN" dirty="0" smtClean="0"/>
+              <a:rPr lang="en-IN" dirty="0"/>
               <a:t>Processor unit</a:t>
             </a:r>
-            <a:endParaRPr lang="en-IN" dirty="0"/>
           </a:p>
         </p:txBody>
       </p:sp>
@@ -6336,7 +6240,7 @@
           <a:blip r:embed="rId2">
             <a:extLst>
               <a:ext uri="{28A0092B-C50C-407E-A947-70E740481C1C}">
-                <a14:useLocalDpi xmlns="" xmlns:a14="http://schemas.microsoft.com/office/drawing/2010/main" val="0"/>
+                <a14:useLocalDpi xmlns:a14="http://schemas.microsoft.com/office/drawing/2010/main" val="0"/>
               </a:ext>
             </a:extLst>
           </a:blip>
@@ -6359,14 +6263,14 @@
           </a:ln>
           <a:extLst>
             <a:ext uri="{909E8E84-426E-40DD-AFC4-6F175D3DCCD1}">
-              <a14:hiddenFill xmlns="" xmlns:a14="http://schemas.microsoft.com/office/drawing/2010/main">
+              <a14:hiddenFill xmlns:a14="http://schemas.microsoft.com/office/drawing/2010/main">
                 <a:solidFill>
                   <a:schemeClr val="accent1"/>
                 </a:solidFill>
               </a14:hiddenFill>
             </a:ext>
             <a:ext uri="{91240B29-F687-4F45-9708-019B960494DF}">
-              <a14:hiddenLine xmlns="" xmlns:a14="http://schemas.microsoft.com/office/drawing/2010/main" w="9525">
+              <a14:hiddenLine xmlns:a14="http://schemas.microsoft.com/office/drawing/2010/main" w="9525">
                 <a:solidFill>
                   <a:schemeClr val="tx1"/>
                 </a:solidFill>
@@ -6381,7 +6285,7 @@
     </p:spTree>
     <p:extLst>
       <p:ext uri="{BB962C8B-B14F-4D97-AF65-F5344CB8AC3E}">
-        <p14:creationId xmlns="" xmlns:p14="http://schemas.microsoft.com/office/powerpoint/2010/main" val="2330409307"/>
+        <p14:creationId xmlns:p14="http://schemas.microsoft.com/office/powerpoint/2010/main" val="2330409307"/>
       </p:ext>
     </p:extLst>
   </p:cSld>
@@ -6439,7 +6343,7 @@
           <a:blip r:embed="rId2">
             <a:extLst>
               <a:ext uri="{28A0092B-C50C-407E-A947-70E740481C1C}">
-                <a14:useLocalDpi xmlns="" xmlns:a14="http://schemas.microsoft.com/office/drawing/2010/main" val="0"/>
+                <a14:useLocalDpi xmlns:a14="http://schemas.microsoft.com/office/drawing/2010/main" val="0"/>
               </a:ext>
             </a:extLst>
           </a:blip>
@@ -6462,14 +6366,14 @@
           </a:ln>
           <a:extLst>
             <a:ext uri="{909E8E84-426E-40DD-AFC4-6F175D3DCCD1}">
-              <a14:hiddenFill xmlns="" xmlns:a14="http://schemas.microsoft.com/office/drawing/2010/main">
+              <a14:hiddenFill xmlns:a14="http://schemas.microsoft.com/office/drawing/2010/main">
                 <a:solidFill>
                   <a:schemeClr val="accent1"/>
                 </a:solidFill>
               </a14:hiddenFill>
             </a:ext>
             <a:ext uri="{91240B29-F687-4F45-9708-019B960494DF}">
-              <a14:hiddenLine xmlns="" xmlns:a14="http://schemas.microsoft.com/office/drawing/2010/main" w="9525">
+              <a14:hiddenLine xmlns:a14="http://schemas.microsoft.com/office/drawing/2010/main" w="9525">
                 <a:solidFill>
                   <a:schemeClr val="tx1"/>
                 </a:solidFill>
@@ -6495,7 +6399,7 @@
           <a:blip r:embed="rId3">
             <a:extLst>
               <a:ext uri="{28A0092B-C50C-407E-A947-70E740481C1C}">
-                <a14:useLocalDpi xmlns="" xmlns:a14="http://schemas.microsoft.com/office/drawing/2010/main" val="0"/>
+                <a14:useLocalDpi xmlns:a14="http://schemas.microsoft.com/office/drawing/2010/main" val="0"/>
               </a:ext>
             </a:extLst>
           </a:blip>
@@ -6518,14 +6422,14 @@
           </a:ln>
           <a:extLst>
             <a:ext uri="{909E8E84-426E-40DD-AFC4-6F175D3DCCD1}">
-              <a14:hiddenFill xmlns="" xmlns:a14="http://schemas.microsoft.com/office/drawing/2010/main">
+              <a14:hiddenFill xmlns:a14="http://schemas.microsoft.com/office/drawing/2010/main">
                 <a:solidFill>
                   <a:schemeClr val="accent1"/>
                 </a:solidFill>
               </a14:hiddenFill>
             </a:ext>
             <a:ext uri="{91240B29-F687-4F45-9708-019B960494DF}">
-              <a14:hiddenLine xmlns="" xmlns:a14="http://schemas.microsoft.com/office/drawing/2010/main" w="9525">
+              <a14:hiddenLine xmlns:a14="http://schemas.microsoft.com/office/drawing/2010/main" w="9525">
                 <a:solidFill>
                   <a:schemeClr val="tx1"/>
                 </a:solidFill>
@@ -6540,20 +6444,13 @@
     </p:spTree>
     <p:extLst>
       <p:ext uri="{BB962C8B-B14F-4D97-AF65-F5344CB8AC3E}">
-        <p14:creationId xmlns="" xmlns:p14="http://schemas.microsoft.com/office/powerpoint/2010/main" val="1234500053"/>
+        <p14:creationId xmlns:p14="http://schemas.microsoft.com/office/powerpoint/2010/main" val="1234500053"/>
       </p:ext>
     </p:extLst>
   </p:cSld>
   <p:clrMapOvr>
     <a:masterClrMapping/>
   </p:clrMapOvr>
-  <p:timing>
-    <p:tnLst>
-      <p:par>
-        <p:cTn id="1" dur="indefinite" restart="never" nodeType="tmRoot"/>
-      </p:par>
-    </p:tnLst>
-  </p:timing>
 </p:sld>
 </file>
 
@@ -6590,10 +6487,9 @@
           <a:lstStyle/>
           <a:p>
             <a:r>
-              <a:rPr lang="en-IN" dirty="0" smtClean="0"/>
+              <a:rPr lang="en-IN" dirty="0"/>
               <a:t>Accumulator register</a:t>
             </a:r>
-            <a:endParaRPr lang="en-IN" dirty="0"/>
           </a:p>
         </p:txBody>
       </p:sp>
@@ -6628,7 +6524,7 @@
           <a:blip r:embed="rId2">
             <a:extLst>
               <a:ext uri="{28A0092B-C50C-407E-A947-70E740481C1C}">
-                <a14:useLocalDpi xmlns="" xmlns:a14="http://schemas.microsoft.com/office/drawing/2010/main" val="0"/>
+                <a14:useLocalDpi xmlns:a14="http://schemas.microsoft.com/office/drawing/2010/main" val="0"/>
               </a:ext>
             </a:extLst>
           </a:blip>
@@ -6651,14 +6547,14 @@
           </a:ln>
           <a:extLst>
             <a:ext uri="{909E8E84-426E-40DD-AFC4-6F175D3DCCD1}">
-              <a14:hiddenFill xmlns="" xmlns:a14="http://schemas.microsoft.com/office/drawing/2010/main">
+              <a14:hiddenFill xmlns:a14="http://schemas.microsoft.com/office/drawing/2010/main">
                 <a:solidFill>
                   <a:schemeClr val="accent1"/>
                 </a:solidFill>
               </a14:hiddenFill>
             </a:ext>
             <a:ext uri="{91240B29-F687-4F45-9708-019B960494DF}">
-              <a14:hiddenLine xmlns="" xmlns:a14="http://schemas.microsoft.com/office/drawing/2010/main" w="9525">
+              <a14:hiddenLine xmlns:a14="http://schemas.microsoft.com/office/drawing/2010/main" w="9525">
                 <a:solidFill>
                   <a:schemeClr val="tx1"/>
                 </a:solidFill>
@@ -6682,7 +6578,7 @@
           <a:blip r:embed="rId3">
             <a:extLst>
               <a:ext uri="{28A0092B-C50C-407E-A947-70E740481C1C}">
-                <a14:useLocalDpi xmlns="" xmlns:a14="http://schemas.microsoft.com/office/drawing/2010/main" val="0"/>
+                <a14:useLocalDpi xmlns:a14="http://schemas.microsoft.com/office/drawing/2010/main" val="0"/>
               </a:ext>
             </a:extLst>
           </a:blip>
@@ -6705,14 +6601,14 @@
           </a:ln>
           <a:extLst>
             <a:ext uri="{909E8E84-426E-40DD-AFC4-6F175D3DCCD1}">
-              <a14:hiddenFill xmlns="" xmlns:a14="http://schemas.microsoft.com/office/drawing/2010/main">
+              <a14:hiddenFill xmlns:a14="http://schemas.microsoft.com/office/drawing/2010/main">
                 <a:solidFill>
                   <a:schemeClr val="accent1"/>
                 </a:solidFill>
               </a14:hiddenFill>
             </a:ext>
             <a:ext uri="{91240B29-F687-4F45-9708-019B960494DF}">
-              <a14:hiddenLine xmlns="" xmlns:a14="http://schemas.microsoft.com/office/drawing/2010/main" w="9525">
+              <a14:hiddenLine xmlns:a14="http://schemas.microsoft.com/office/drawing/2010/main" w="9525">
                 <a:solidFill>
                   <a:schemeClr val="tx1"/>
                 </a:solidFill>
@@ -6727,20 +6623,13 @@
     </p:spTree>
     <p:extLst>
       <p:ext uri="{BB962C8B-B14F-4D97-AF65-F5344CB8AC3E}">
-        <p14:creationId xmlns="" xmlns:p14="http://schemas.microsoft.com/office/powerpoint/2010/main" val="3482194143"/>
+        <p14:creationId xmlns:p14="http://schemas.microsoft.com/office/powerpoint/2010/main" val="3482194143"/>
       </p:ext>
     </p:extLst>
   </p:cSld>
   <p:clrMapOvr>
     <a:masterClrMapping/>
   </p:clrMapOvr>
-  <p:timing>
-    <p:tnLst>
-      <p:par>
-        <p:cTn id="1" dur="indefinite" restart="never" nodeType="tmRoot"/>
-      </p:par>
-    </p:tnLst>
-  </p:timing>
 </p:sld>
 </file>
 
@@ -6777,10 +6666,9 @@
           <a:lstStyle/>
           <a:p>
             <a:r>
-              <a:rPr lang="en-IN" dirty="0" smtClean="0"/>
+              <a:rPr lang="en-IN" dirty="0"/>
               <a:t>Accumulator design</a:t>
             </a:r>
-            <a:endParaRPr lang="en-IN" dirty="0"/>
           </a:p>
         </p:txBody>
       </p:sp>
@@ -6800,28 +6688,23 @@
           <a:lstStyle/>
           <a:p>
             <a:r>
-              <a:rPr lang="en-IN" dirty="0" smtClean="0"/>
+              <a:rPr lang="en-IN" dirty="0"/>
               <a:t>N bit accumulator needs n stages connected in cascade</a:t>
             </a:r>
           </a:p>
           <a:p>
             <a:r>
               <a:rPr lang="en-IN" dirty="0"/>
-              <a:t> </a:t>
-            </a:r>
-            <a:r>
-              <a:rPr lang="en-IN" dirty="0" smtClean="0"/>
-              <a:t>Each stage have a JK </a:t>
-            </a:r>
-            <a:r>
-              <a:rPr lang="en-IN" dirty="0" err="1" smtClean="0"/>
+              <a:t> Each stage have a JK </a:t>
+            </a:r>
+            <a:r>
+              <a:rPr lang="en-IN" dirty="0" err="1"/>
               <a:t>flipflop</a:t>
             </a:r>
             <a:r>
-              <a:rPr lang="en-IN" dirty="0" smtClean="0"/>
+              <a:rPr lang="en-IN" dirty="0"/>
               <a:t> with associated circuitries</a:t>
             </a:r>
-            <a:endParaRPr lang="en-IN" dirty="0"/>
           </a:p>
         </p:txBody>
       </p:sp>
@@ -6837,7 +6720,7 @@
           <a:blip r:embed="rId2">
             <a:extLst>
               <a:ext uri="{28A0092B-C50C-407E-A947-70E740481C1C}">
-                <a14:useLocalDpi xmlns="" xmlns:a14="http://schemas.microsoft.com/office/drawing/2010/main" val="0"/>
+                <a14:useLocalDpi xmlns:a14="http://schemas.microsoft.com/office/drawing/2010/main" val="0"/>
               </a:ext>
             </a:extLst>
           </a:blip>
@@ -6860,14 +6743,14 @@
           </a:ln>
           <a:extLst>
             <a:ext uri="{909E8E84-426E-40DD-AFC4-6F175D3DCCD1}">
-              <a14:hiddenFill xmlns="" xmlns:a14="http://schemas.microsoft.com/office/drawing/2010/main">
+              <a14:hiddenFill xmlns:a14="http://schemas.microsoft.com/office/drawing/2010/main">
                 <a:solidFill>
                   <a:schemeClr val="accent1"/>
                 </a:solidFill>
               </a14:hiddenFill>
             </a:ext>
             <a:ext uri="{91240B29-F687-4F45-9708-019B960494DF}">
-              <a14:hiddenLine xmlns="" xmlns:a14="http://schemas.microsoft.com/office/drawing/2010/main" w="9525">
+              <a14:hiddenLine xmlns:a14="http://schemas.microsoft.com/office/drawing/2010/main" w="9525">
                 <a:solidFill>
                   <a:schemeClr val="tx1"/>
                 </a:solidFill>
@@ -6882,20 +6765,13 @@
     </p:spTree>
     <p:extLst>
       <p:ext uri="{BB962C8B-B14F-4D97-AF65-F5344CB8AC3E}">
-        <p14:creationId xmlns="" xmlns:p14="http://schemas.microsoft.com/office/powerpoint/2010/main" val="1821564658"/>
+        <p14:creationId xmlns:p14="http://schemas.microsoft.com/office/powerpoint/2010/main" val="1821564658"/>
       </p:ext>
     </p:extLst>
   </p:cSld>
   <p:clrMapOvr>
     <a:masterClrMapping/>
   </p:clrMapOvr>
-  <p:timing>
-    <p:tnLst>
-      <p:par>
-        <p:cTn id="1" dur="indefinite" restart="never" nodeType="tmRoot"/>
-      </p:par>
-    </p:tnLst>
-  </p:timing>
 </p:sld>
 </file>
 
@@ -6969,7 +6845,7 @@
           <a:blip r:embed="rId2">
             <a:extLst>
               <a:ext uri="{28A0092B-C50C-407E-A947-70E740481C1C}">
-                <a14:useLocalDpi xmlns="" xmlns:a14="http://schemas.microsoft.com/office/drawing/2010/main" val="0"/>
+                <a14:useLocalDpi xmlns:a14="http://schemas.microsoft.com/office/drawing/2010/main" val="0"/>
               </a:ext>
             </a:extLst>
           </a:blip>
@@ -6992,14 +6868,14 @@
           </a:ln>
           <a:extLst>
             <a:ext uri="{909E8E84-426E-40DD-AFC4-6F175D3DCCD1}">
-              <a14:hiddenFill xmlns="" xmlns:a14="http://schemas.microsoft.com/office/drawing/2010/main">
+              <a14:hiddenFill xmlns:a14="http://schemas.microsoft.com/office/drawing/2010/main">
                 <a:solidFill>
                   <a:schemeClr val="accent1"/>
                 </a:solidFill>
               </a14:hiddenFill>
             </a:ext>
             <a:ext uri="{91240B29-F687-4F45-9708-019B960494DF}">
-              <a14:hiddenLine xmlns="" xmlns:a14="http://schemas.microsoft.com/office/drawing/2010/main" w="9525">
+              <a14:hiddenLine xmlns:a14="http://schemas.microsoft.com/office/drawing/2010/main" w="9525">
                 <a:solidFill>
                   <a:schemeClr val="tx1"/>
                 </a:solidFill>
@@ -7014,20 +6890,13 @@
     </p:spTree>
     <p:extLst>
       <p:ext uri="{BB962C8B-B14F-4D97-AF65-F5344CB8AC3E}">
-        <p14:creationId xmlns="" xmlns:p14="http://schemas.microsoft.com/office/powerpoint/2010/main" val="968536481"/>
+        <p14:creationId xmlns:p14="http://schemas.microsoft.com/office/powerpoint/2010/main" val="968536481"/>
       </p:ext>
     </p:extLst>
   </p:cSld>
   <p:clrMapOvr>
     <a:masterClrMapping/>
   </p:clrMapOvr>
-  <p:timing>
-    <p:tnLst>
-      <p:par>
-        <p:cTn id="1" dur="indefinite" restart="never" nodeType="tmRoot"/>
-      </p:par>
-    </p:tnLst>
-  </p:timing>
 </p:sld>
 </file>
 
@@ -7084,7 +6953,7 @@
           <a:blip r:embed="rId2">
             <a:extLst>
               <a:ext uri="{28A0092B-C50C-407E-A947-70E740481C1C}">
-                <a14:useLocalDpi xmlns="" xmlns:a14="http://schemas.microsoft.com/office/drawing/2010/main" val="0"/>
+                <a14:useLocalDpi xmlns:a14="http://schemas.microsoft.com/office/drawing/2010/main" val="0"/>
               </a:ext>
             </a:extLst>
           </a:blip>
@@ -7107,14 +6976,14 @@
           </a:ln>
           <a:extLst>
             <a:ext uri="{909E8E84-426E-40DD-AFC4-6F175D3DCCD1}">
-              <a14:hiddenFill xmlns="" xmlns:a14="http://schemas.microsoft.com/office/drawing/2010/main">
+              <a14:hiddenFill xmlns:a14="http://schemas.microsoft.com/office/drawing/2010/main">
                 <a:solidFill>
                   <a:schemeClr val="accent1"/>
                 </a:solidFill>
               </a14:hiddenFill>
             </a:ext>
             <a:ext uri="{91240B29-F687-4F45-9708-019B960494DF}">
-              <a14:hiddenLine xmlns="" xmlns:a14="http://schemas.microsoft.com/office/drawing/2010/main" w="9525">
+              <a14:hiddenLine xmlns:a14="http://schemas.microsoft.com/office/drawing/2010/main" w="9525">
                 <a:solidFill>
                   <a:schemeClr val="tx1"/>
                 </a:solidFill>
@@ -7138,7 +7007,7 @@
           <a:blip r:embed="rId3">
             <a:extLst>
               <a:ext uri="{28A0092B-C50C-407E-A947-70E740481C1C}">
-                <a14:useLocalDpi xmlns="" xmlns:a14="http://schemas.microsoft.com/office/drawing/2010/main" val="0"/>
+                <a14:useLocalDpi xmlns:a14="http://schemas.microsoft.com/office/drawing/2010/main" val="0"/>
               </a:ext>
             </a:extLst>
           </a:blip>
@@ -7161,14 +7030,14 @@
           </a:ln>
           <a:extLst>
             <a:ext uri="{909E8E84-426E-40DD-AFC4-6F175D3DCCD1}">
-              <a14:hiddenFill xmlns="" xmlns:a14="http://schemas.microsoft.com/office/drawing/2010/main">
+              <a14:hiddenFill xmlns:a14="http://schemas.microsoft.com/office/drawing/2010/main">
                 <a:solidFill>
                   <a:schemeClr val="accent1"/>
                 </a:solidFill>
               </a14:hiddenFill>
             </a:ext>
             <a:ext uri="{91240B29-F687-4F45-9708-019B960494DF}">
-              <a14:hiddenLine xmlns="" xmlns:a14="http://schemas.microsoft.com/office/drawing/2010/main" w="9525">
+              <a14:hiddenLine xmlns:a14="http://schemas.microsoft.com/office/drawing/2010/main" w="9525">
                 <a:solidFill>
                   <a:schemeClr val="tx1"/>
                 </a:solidFill>
@@ -7183,20 +7052,13 @@
     </p:spTree>
     <p:extLst>
       <p:ext uri="{BB962C8B-B14F-4D97-AF65-F5344CB8AC3E}">
-        <p14:creationId xmlns="" xmlns:p14="http://schemas.microsoft.com/office/powerpoint/2010/main" val="3099775314"/>
+        <p14:creationId xmlns:p14="http://schemas.microsoft.com/office/powerpoint/2010/main" val="3099775314"/>
       </p:ext>
     </p:extLst>
   </p:cSld>
   <p:clrMapOvr>
     <a:masterClrMapping/>
   </p:clrMapOvr>
-  <p:timing>
-    <p:tnLst>
-      <p:par>
-        <p:cTn id="1" dur="indefinite" restart="never" nodeType="tmRoot"/>
-      </p:par>
-    </p:tnLst>
-  </p:timing>
 </p:sld>
 </file>
 
@@ -7233,56 +7095,46 @@
           <a:lstStyle/>
           <a:p>
             <a:r>
-              <a:rPr lang="en-IN" dirty="0" smtClean="0"/>
+              <a:rPr lang="en-IN" dirty="0"/>
               <a:t>Accumulator design</a:t>
             </a:r>
+          </a:p>
+        </p:txBody>
+      </p:sp>
+      <p:sp>
+        <p:nvSpPr>
+          <p:cNvPr id="3" name="Content Placeholder 2"/>
+          <p:cNvSpPr>
+            <a:spLocks noGrp="1"/>
+          </p:cNvSpPr>
+          <p:nvPr>
+            <p:ph idx="1"/>
+          </p:nvPr>
+        </p:nvSpPr>
+        <p:spPr/>
+        <p:txBody>
+          <a:bodyPr/>
+          <a:lstStyle/>
+          <a:p>
+            <a:r>
+              <a:rPr lang="en-IN" dirty="0"/>
+              <a:t>Accumulator: clear</a:t>
+            </a:r>
+          </a:p>
+          <a:p>
             <a:endParaRPr lang="en-IN" dirty="0"/>
           </a:p>
-        </p:txBody>
-      </p:sp>
-      <p:sp>
-        <p:nvSpPr>
-          <p:cNvPr id="3" name="Content Placeholder 2"/>
-          <p:cNvSpPr>
-            <a:spLocks noGrp="1"/>
-          </p:cNvSpPr>
-          <p:nvPr>
-            <p:ph idx="1"/>
-          </p:nvPr>
-        </p:nvSpPr>
-        <p:spPr/>
-        <p:txBody>
-          <a:bodyPr/>
-          <a:lstStyle/>
-          <a:p>
-            <a:r>
-              <a:rPr lang="en-IN" dirty="0" smtClean="0"/>
-              <a:t>Accumulator</a:t>
-            </a:r>
+          <a:p>
+            <a:endParaRPr lang="en-IN" dirty="0"/>
+          </a:p>
+          <a:p>
+            <a:endParaRPr lang="en-IN" dirty="0"/>
+          </a:p>
+          <a:p>
             <a:r>
               <a:rPr lang="en-IN" dirty="0"/>
-              <a:t>: </a:t>
-            </a:r>
-            <a:r>
-              <a:rPr lang="en-IN" dirty="0" smtClean="0"/>
-              <a:t>clear</a:t>
-            </a:r>
-          </a:p>
-          <a:p>
-            <a:endParaRPr lang="en-IN" dirty="0"/>
-          </a:p>
-          <a:p>
-            <a:endParaRPr lang="en-IN" dirty="0" smtClean="0"/>
-          </a:p>
-          <a:p>
-            <a:endParaRPr lang="en-IN" dirty="0"/>
-          </a:p>
-          <a:p>
-            <a:r>
-              <a:rPr lang="en-IN" dirty="0" smtClean="0"/>
               <a:t>Complement</a:t>
             </a:r>
-            <a:endParaRPr lang="en-IN" dirty="0"/>
           </a:p>
         </p:txBody>
       </p:sp>
@@ -7298,7 +7150,7 @@
           <a:blip r:embed="rId2">
             <a:extLst>
               <a:ext uri="{28A0092B-C50C-407E-A947-70E740481C1C}">
-                <a14:useLocalDpi xmlns="" xmlns:a14="http://schemas.microsoft.com/office/drawing/2010/main" val="0"/>
+                <a14:useLocalDpi xmlns:a14="http://schemas.microsoft.com/office/drawing/2010/main" val="0"/>
               </a:ext>
             </a:extLst>
           </a:blip>
@@ -7321,14 +7173,14 @@
           </a:ln>
           <a:extLst>
             <a:ext uri="{909E8E84-426E-40DD-AFC4-6F175D3DCCD1}">
-              <a14:hiddenFill xmlns="" xmlns:a14="http://schemas.microsoft.com/office/drawing/2010/main">
+              <a14:hiddenFill xmlns:a14="http://schemas.microsoft.com/office/drawing/2010/main">
                 <a:solidFill>
                   <a:schemeClr val="accent1"/>
                 </a:solidFill>
               </a14:hiddenFill>
             </a:ext>
             <a:ext uri="{91240B29-F687-4F45-9708-019B960494DF}">
-              <a14:hiddenLine xmlns="" xmlns:a14="http://schemas.microsoft.com/office/drawing/2010/main" w="9525">
+              <a14:hiddenLine xmlns:a14="http://schemas.microsoft.com/office/drawing/2010/main" w="9525">
                 <a:solidFill>
                   <a:schemeClr val="tx1"/>
                 </a:solidFill>
@@ -7352,7 +7204,7 @@
           <a:blip r:embed="rId3">
             <a:extLst>
               <a:ext uri="{28A0092B-C50C-407E-A947-70E740481C1C}">
-                <a14:useLocalDpi xmlns="" xmlns:a14="http://schemas.microsoft.com/office/drawing/2010/main" val="0"/>
+                <a14:useLocalDpi xmlns:a14="http://schemas.microsoft.com/office/drawing/2010/main" val="0"/>
               </a:ext>
             </a:extLst>
           </a:blip>
@@ -7375,14 +7227,14 @@
           </a:ln>
           <a:extLst>
             <a:ext uri="{909E8E84-426E-40DD-AFC4-6F175D3DCCD1}">
-              <a14:hiddenFill xmlns="" xmlns:a14="http://schemas.microsoft.com/office/drawing/2010/main">
+              <a14:hiddenFill xmlns:a14="http://schemas.microsoft.com/office/drawing/2010/main">
                 <a:solidFill>
                   <a:schemeClr val="accent1"/>
                 </a:solidFill>
               </a14:hiddenFill>
             </a:ext>
             <a:ext uri="{91240B29-F687-4F45-9708-019B960494DF}">
-              <a14:hiddenLine xmlns="" xmlns:a14="http://schemas.microsoft.com/office/drawing/2010/main" w="9525">
+              <a14:hiddenLine xmlns:a14="http://schemas.microsoft.com/office/drawing/2010/main" w="9525">
                 <a:solidFill>
                   <a:schemeClr val="tx1"/>
                 </a:solidFill>
@@ -7397,20 +7249,13 @@
     </p:spTree>
     <p:extLst>
       <p:ext uri="{BB962C8B-B14F-4D97-AF65-F5344CB8AC3E}">
-        <p14:creationId xmlns="" xmlns:p14="http://schemas.microsoft.com/office/powerpoint/2010/main" val="607540093"/>
+        <p14:creationId xmlns:p14="http://schemas.microsoft.com/office/powerpoint/2010/main" val="607540093"/>
       </p:ext>
     </p:extLst>
   </p:cSld>
   <p:clrMapOvr>
     <a:masterClrMapping/>
   </p:clrMapOvr>
-  <p:timing>
-    <p:tnLst>
-      <p:par>
-        <p:cTn id="1" dur="indefinite" restart="never" nodeType="tmRoot"/>
-      </p:par>
-    </p:tnLst>
-  </p:timing>
 </p:sld>
 </file>
 
@@ -7481,7 +7326,7 @@
           <a:blip r:embed="rId2">
             <a:extLst>
               <a:ext uri="{28A0092B-C50C-407E-A947-70E740481C1C}">
-                <a14:useLocalDpi xmlns="" xmlns:a14="http://schemas.microsoft.com/office/drawing/2010/main" val="0"/>
+                <a14:useLocalDpi xmlns:a14="http://schemas.microsoft.com/office/drawing/2010/main" val="0"/>
               </a:ext>
             </a:extLst>
           </a:blip>
@@ -7504,14 +7349,14 @@
           </a:ln>
           <a:extLst>
             <a:ext uri="{909E8E84-426E-40DD-AFC4-6F175D3DCCD1}">
-              <a14:hiddenFill xmlns="" xmlns:a14="http://schemas.microsoft.com/office/drawing/2010/main">
+              <a14:hiddenFill xmlns:a14="http://schemas.microsoft.com/office/drawing/2010/main">
                 <a:solidFill>
                   <a:schemeClr val="accent1"/>
                 </a:solidFill>
               </a14:hiddenFill>
             </a:ext>
             <a:ext uri="{91240B29-F687-4F45-9708-019B960494DF}">
-              <a14:hiddenLine xmlns="" xmlns:a14="http://schemas.microsoft.com/office/drawing/2010/main" w="9525">
+              <a14:hiddenLine xmlns:a14="http://schemas.microsoft.com/office/drawing/2010/main" w="9525">
                 <a:solidFill>
                   <a:schemeClr val="tx1"/>
                 </a:solidFill>
@@ -7526,20 +7371,13 @@
     </p:spTree>
     <p:extLst>
       <p:ext uri="{BB962C8B-B14F-4D97-AF65-F5344CB8AC3E}">
-        <p14:creationId xmlns="" xmlns:p14="http://schemas.microsoft.com/office/powerpoint/2010/main" val="2140829458"/>
+        <p14:creationId xmlns:p14="http://schemas.microsoft.com/office/powerpoint/2010/main" val="2140829458"/>
       </p:ext>
     </p:extLst>
   </p:cSld>
   <p:clrMapOvr>
     <a:masterClrMapping/>
   </p:clrMapOvr>
-  <p:timing>
-    <p:tnLst>
-      <p:par>
-        <p:cTn id="1" dur="indefinite" restart="never" nodeType="tmRoot"/>
-      </p:par>
-    </p:tnLst>
-  </p:timing>
 </p:sld>
 </file>
 
@@ -7595,10 +7433,9 @@
           <a:lstStyle/>
           <a:p>
             <a:r>
-              <a:rPr lang="en-IN" dirty="0" smtClean="0"/>
+              <a:rPr lang="en-IN" dirty="0"/>
               <a:t>One stage accumulator</a:t>
             </a:r>
-            <a:endParaRPr lang="en-IN" dirty="0"/>
           </a:p>
         </p:txBody>
       </p:sp>
@@ -7614,7 +7451,7 @@
           <a:blip r:embed="rId2">
             <a:extLst>
               <a:ext uri="{28A0092B-C50C-407E-A947-70E740481C1C}">
-                <a14:useLocalDpi xmlns="" xmlns:a14="http://schemas.microsoft.com/office/drawing/2010/main" val="0"/>
+                <a14:useLocalDpi xmlns:a14="http://schemas.microsoft.com/office/drawing/2010/main" val="0"/>
               </a:ext>
             </a:extLst>
           </a:blip>
@@ -7637,14 +7474,14 @@
           </a:ln>
           <a:extLst>
             <a:ext uri="{909E8E84-426E-40DD-AFC4-6F175D3DCCD1}">
-              <a14:hiddenFill xmlns="" xmlns:a14="http://schemas.microsoft.com/office/drawing/2010/main">
+              <a14:hiddenFill xmlns:a14="http://schemas.microsoft.com/office/drawing/2010/main">
                 <a:solidFill>
                   <a:schemeClr val="accent1"/>
                 </a:solidFill>
               </a14:hiddenFill>
             </a:ext>
             <a:ext uri="{91240B29-F687-4F45-9708-019B960494DF}">
-              <a14:hiddenLine xmlns="" xmlns:a14="http://schemas.microsoft.com/office/drawing/2010/main" w="9525">
+              <a14:hiddenLine xmlns:a14="http://schemas.microsoft.com/office/drawing/2010/main" w="9525">
                 <a:solidFill>
                   <a:schemeClr val="tx1"/>
                 </a:solidFill>
@@ -7668,7 +7505,7 @@
           <a:blip r:embed="rId3">
             <a:extLst>
               <a:ext uri="{28A0092B-C50C-407E-A947-70E740481C1C}">
-                <a14:useLocalDpi xmlns="" xmlns:a14="http://schemas.microsoft.com/office/drawing/2010/main" val="0"/>
+                <a14:useLocalDpi xmlns:a14="http://schemas.microsoft.com/office/drawing/2010/main" val="0"/>
               </a:ext>
             </a:extLst>
           </a:blip>
@@ -7691,14 +7528,14 @@
           </a:ln>
           <a:extLst>
             <a:ext uri="{909E8E84-426E-40DD-AFC4-6F175D3DCCD1}">
-              <a14:hiddenFill xmlns="" xmlns:a14="http://schemas.microsoft.com/office/drawing/2010/main">
+              <a14:hiddenFill xmlns:a14="http://schemas.microsoft.com/office/drawing/2010/main">
                 <a:solidFill>
                   <a:schemeClr val="accent1"/>
                 </a:solidFill>
               </a14:hiddenFill>
             </a:ext>
             <a:ext uri="{91240B29-F687-4F45-9708-019B960494DF}">
-              <a14:hiddenLine xmlns="" xmlns:a14="http://schemas.microsoft.com/office/drawing/2010/main" w="9525">
+              <a14:hiddenLine xmlns:a14="http://schemas.microsoft.com/office/drawing/2010/main" w="9525">
                 <a:solidFill>
                   <a:schemeClr val="tx1"/>
                 </a:solidFill>
@@ -7713,20 +7550,13 @@
     </p:spTree>
     <p:extLst>
       <p:ext uri="{BB962C8B-B14F-4D97-AF65-F5344CB8AC3E}">
-        <p14:creationId xmlns="" xmlns:p14="http://schemas.microsoft.com/office/powerpoint/2010/main" val="439284485"/>
+        <p14:creationId xmlns:p14="http://schemas.microsoft.com/office/powerpoint/2010/main" val="439284485"/>
       </p:ext>
     </p:extLst>
   </p:cSld>
   <p:clrMapOvr>
     <a:masterClrMapping/>
   </p:clrMapOvr>
-  <p:timing>
-    <p:tnLst>
-      <p:par>
-        <p:cTn id="1" dur="indefinite" restart="never" nodeType="tmRoot"/>
-      </p:par>
-    </p:tnLst>
-  </p:timing>
 </p:sld>
 </file>
 
@@ -7763,10 +7593,9 @@
           <a:lstStyle/>
           <a:p>
             <a:r>
-              <a:rPr lang="en-IN" smtClean="0"/>
+              <a:rPr lang="en-IN"/>
               <a:t> </a:t>
             </a:r>
-            <a:endParaRPr lang="en-IN"/>
           </a:p>
         </p:txBody>
       </p:sp>
@@ -7801,7 +7630,7 @@
           <a:blip r:embed="rId2">
             <a:extLst>
               <a:ext uri="{28A0092B-C50C-407E-A947-70E740481C1C}">
-                <a14:useLocalDpi xmlns="" xmlns:a14="http://schemas.microsoft.com/office/drawing/2010/main" val="0"/>
+                <a14:useLocalDpi xmlns:a14="http://schemas.microsoft.com/office/drawing/2010/main" val="0"/>
               </a:ext>
             </a:extLst>
           </a:blip>
@@ -7824,14 +7653,14 @@
           </a:ln>
           <a:extLst>
             <a:ext uri="{909E8E84-426E-40DD-AFC4-6F175D3DCCD1}">
-              <a14:hiddenFill xmlns="" xmlns:a14="http://schemas.microsoft.com/office/drawing/2010/main">
+              <a14:hiddenFill xmlns:a14="http://schemas.microsoft.com/office/drawing/2010/main">
                 <a:solidFill>
                   <a:schemeClr val="accent1"/>
                 </a:solidFill>
               </a14:hiddenFill>
             </a:ext>
             <a:ext uri="{91240B29-F687-4F45-9708-019B960494DF}">
-              <a14:hiddenLine xmlns="" xmlns:a14="http://schemas.microsoft.com/office/drawing/2010/main" w="9525">
+              <a14:hiddenLine xmlns:a14="http://schemas.microsoft.com/office/drawing/2010/main" w="9525">
                 <a:solidFill>
                   <a:schemeClr val="tx1"/>
                 </a:solidFill>
@@ -7846,20 +7675,13 @@
     </p:spTree>
     <p:extLst>
       <p:ext uri="{BB962C8B-B14F-4D97-AF65-F5344CB8AC3E}">
-        <p14:creationId xmlns="" xmlns:p14="http://schemas.microsoft.com/office/powerpoint/2010/main" val="183622412"/>
+        <p14:creationId xmlns:p14="http://schemas.microsoft.com/office/powerpoint/2010/main" val="183622412"/>
       </p:ext>
     </p:extLst>
   </p:cSld>
   <p:clrMapOvr>
     <a:masterClrMapping/>
   </p:clrMapOvr>
-  <p:timing>
-    <p:tnLst>
-      <p:par>
-        <p:cTn id="1" dur="indefinite" restart="never" nodeType="tmRoot"/>
-      </p:par>
-    </p:tnLst>
-  </p:timing>
 </p:sld>
 </file>
 
@@ -7896,10 +7718,9 @@
           <a:lstStyle/>
           <a:p>
             <a:r>
-              <a:rPr lang="en-IN" dirty="0" smtClean="0"/>
+              <a:rPr lang="en-IN" dirty="0"/>
               <a:t>Processor- scratchpad memory</a:t>
             </a:r>
-            <a:endParaRPr lang="en-IN" dirty="0"/>
           </a:p>
         </p:txBody>
       </p:sp>
@@ -7919,27 +7740,23 @@
           <a:lstStyle/>
           <a:p>
             <a:r>
-              <a:rPr lang="en-IN" dirty="0" smtClean="0"/>
-              <a:t>If registers in processor enclosed in memory unit in processor-scratch pad memory</a:t>
-            </a:r>
-          </a:p>
-          <a:p>
-            <a:r>
-              <a:rPr lang="en-IN" dirty="0" smtClean="0"/>
-              <a:t>Registers </a:t>
-            </a:r>
-            <a:r>
-              <a:rPr lang="en-IN" dirty="0" err="1" smtClean="0"/>
-              <a:t>neednot</a:t>
-            </a:r>
-            <a:r>
-              <a:rPr lang="en-IN" dirty="0" smtClean="0"/>
-              <a:t> be connected through bus, cheaper</a:t>
-            </a:r>
-          </a:p>
-          <a:p>
-            <a:r>
-              <a:rPr lang="en-IN" dirty="0" smtClean="0"/>
+              <a:rPr lang="en-IN" dirty="0"/>
+              <a:t>If registers in processor enclosed in memory unit in processor - scratch pad memory</a:t>
+            </a:r>
+          </a:p>
+          <a:p>
+            <a:r>
+              <a:rPr lang="en-IN"/>
+              <a:t>Registers need not </a:t>
+            </a:r>
+            <a:r>
+              <a:rPr lang="en-IN" dirty="0"/>
+              <a:t>be connected through bus, cheaper</a:t>
+            </a:r>
+          </a:p>
+          <a:p>
+            <a:r>
+              <a:rPr lang="en-IN" dirty="0"/>
               <a:t>The operation</a:t>
             </a:r>
           </a:p>
@@ -7951,7 +7768,7 @@
               <a:buNone/>
             </a:pPr>
             <a:r>
-              <a:rPr lang="en-IN" dirty="0" smtClean="0"/>
+              <a:rPr lang="en-IN" dirty="0"/>
               <a:t>    Performed as:</a:t>
             </a:r>
           </a:p>
@@ -7972,7 +7789,7 @@
           <a:blip r:embed="rId2">
             <a:extLst>
               <a:ext uri="{28A0092B-C50C-407E-A947-70E740481C1C}">
-                <a14:useLocalDpi xmlns="" xmlns:a14="http://schemas.microsoft.com/office/drawing/2010/main" val="0"/>
+                <a14:useLocalDpi xmlns:a14="http://schemas.microsoft.com/office/drawing/2010/main" val="0"/>
               </a:ext>
             </a:extLst>
           </a:blip>
@@ -7995,14 +7812,14 @@
           </a:ln>
           <a:extLst>
             <a:ext uri="{909E8E84-426E-40DD-AFC4-6F175D3DCCD1}">
-              <a14:hiddenFill xmlns="" xmlns:a14="http://schemas.microsoft.com/office/drawing/2010/main">
+              <a14:hiddenFill xmlns:a14="http://schemas.microsoft.com/office/drawing/2010/main">
                 <a:solidFill>
                   <a:schemeClr val="accent1"/>
                 </a:solidFill>
               </a14:hiddenFill>
             </a:ext>
             <a:ext uri="{91240B29-F687-4F45-9708-019B960494DF}">
-              <a14:hiddenLine xmlns="" xmlns:a14="http://schemas.microsoft.com/office/drawing/2010/main" w="9525">
+              <a14:hiddenLine xmlns:a14="http://schemas.microsoft.com/office/drawing/2010/main" w="9525">
                 <a:solidFill>
                   <a:schemeClr val="tx1"/>
                 </a:solidFill>
@@ -8026,7 +7843,7 @@
           <a:blip r:embed="rId3">
             <a:extLst>
               <a:ext uri="{28A0092B-C50C-407E-A947-70E740481C1C}">
-                <a14:useLocalDpi xmlns="" xmlns:a14="http://schemas.microsoft.com/office/drawing/2010/main" val="0"/>
+                <a14:useLocalDpi xmlns:a14="http://schemas.microsoft.com/office/drawing/2010/main" val="0"/>
               </a:ext>
             </a:extLst>
           </a:blip>
@@ -8049,14 +7866,14 @@
           </a:ln>
           <a:extLst>
             <a:ext uri="{909E8E84-426E-40DD-AFC4-6F175D3DCCD1}">
-              <a14:hiddenFill xmlns="" xmlns:a14="http://schemas.microsoft.com/office/drawing/2010/main">
+              <a14:hiddenFill xmlns:a14="http://schemas.microsoft.com/office/drawing/2010/main">
                 <a:solidFill>
                   <a:schemeClr val="accent1"/>
                 </a:solidFill>
               </a14:hiddenFill>
             </a:ext>
             <a:ext uri="{91240B29-F687-4F45-9708-019B960494DF}">
-              <a14:hiddenLine xmlns="" xmlns:a14="http://schemas.microsoft.com/office/drawing/2010/main" w="9525">
+              <a14:hiddenLine xmlns:a14="http://schemas.microsoft.com/office/drawing/2010/main" w="9525">
                 <a:solidFill>
                   <a:schemeClr val="tx1"/>
                 </a:solidFill>
@@ -8071,7 +7888,7 @@
     </p:spTree>
     <p:extLst>
       <p:ext uri="{BB962C8B-B14F-4D97-AF65-F5344CB8AC3E}">
-        <p14:creationId xmlns="" xmlns:p14="http://schemas.microsoft.com/office/powerpoint/2010/main" val="762598990"/>
+        <p14:creationId xmlns:p14="http://schemas.microsoft.com/office/powerpoint/2010/main" val="762598990"/>
       </p:ext>
     </p:extLst>
   </p:cSld>
@@ -8148,7 +7965,7 @@
           <a:blip r:embed="rId2">
             <a:extLst>
               <a:ext uri="{28A0092B-C50C-407E-A947-70E740481C1C}">
-                <a14:useLocalDpi xmlns="" xmlns:a14="http://schemas.microsoft.com/office/drawing/2010/main" val="0"/>
+                <a14:useLocalDpi xmlns:a14="http://schemas.microsoft.com/office/drawing/2010/main" val="0"/>
               </a:ext>
             </a:extLst>
           </a:blip>
@@ -8171,14 +7988,14 @@
           </a:ln>
           <a:extLst>
             <a:ext uri="{909E8E84-426E-40DD-AFC4-6F175D3DCCD1}">
-              <a14:hiddenFill xmlns="" xmlns:a14="http://schemas.microsoft.com/office/drawing/2010/main">
+              <a14:hiddenFill xmlns:a14="http://schemas.microsoft.com/office/drawing/2010/main">
                 <a:solidFill>
                   <a:schemeClr val="accent1"/>
                 </a:solidFill>
               </a14:hiddenFill>
             </a:ext>
             <a:ext uri="{91240B29-F687-4F45-9708-019B960494DF}">
-              <a14:hiddenLine xmlns="" xmlns:a14="http://schemas.microsoft.com/office/drawing/2010/main" w="9525">
+              <a14:hiddenLine xmlns:a14="http://schemas.microsoft.com/office/drawing/2010/main" w="9525">
                 <a:solidFill>
                   <a:schemeClr val="tx1"/>
                 </a:solidFill>
@@ -8193,7 +8010,7 @@
     </p:spTree>
     <p:extLst>
       <p:ext uri="{BB962C8B-B14F-4D97-AF65-F5344CB8AC3E}">
-        <p14:creationId xmlns="" xmlns:p14="http://schemas.microsoft.com/office/powerpoint/2010/main" val="3700920987"/>
+        <p14:creationId xmlns:p14="http://schemas.microsoft.com/office/powerpoint/2010/main" val="3700920987"/>
       </p:ext>
     </p:extLst>
   </p:cSld>
@@ -8258,16 +8075,15 @@
           <a:lstStyle/>
           <a:p>
             <a:r>
-              <a:rPr lang="en-IN" dirty="0" smtClean="0"/>
+              <a:rPr lang="en-IN" dirty="0"/>
               <a:t>To overcome the delay caused when reading two source registers</a:t>
             </a:r>
           </a:p>
           <a:p>
             <a:r>
-              <a:rPr lang="en-IN" dirty="0" smtClean="0"/>
+              <a:rPr lang="en-IN" dirty="0"/>
               <a:t>Has 2 address lines to select 2 words </a:t>
             </a:r>
-            <a:endParaRPr lang="en-IN" dirty="0"/>
           </a:p>
         </p:txBody>
       </p:sp>
@@ -8283,7 +8099,7 @@
           <a:blip r:embed="rId2">
             <a:extLst>
               <a:ext uri="{28A0092B-C50C-407E-A947-70E740481C1C}">
-                <a14:useLocalDpi xmlns="" xmlns:a14="http://schemas.microsoft.com/office/drawing/2010/main" val="0"/>
+                <a14:useLocalDpi xmlns:a14="http://schemas.microsoft.com/office/drawing/2010/main" val="0"/>
               </a:ext>
             </a:extLst>
           </a:blip>
@@ -8306,14 +8122,14 @@
           </a:ln>
           <a:extLst>
             <a:ext uri="{909E8E84-426E-40DD-AFC4-6F175D3DCCD1}">
-              <a14:hiddenFill xmlns="" xmlns:a14="http://schemas.microsoft.com/office/drawing/2010/main">
+              <a14:hiddenFill xmlns:a14="http://schemas.microsoft.com/office/drawing/2010/main">
                 <a:solidFill>
                   <a:schemeClr val="accent1"/>
                 </a:solidFill>
               </a14:hiddenFill>
             </a:ext>
             <a:ext uri="{91240B29-F687-4F45-9708-019B960494DF}">
-              <a14:hiddenLine xmlns="" xmlns:a14="http://schemas.microsoft.com/office/drawing/2010/main" w="9525">
+              <a14:hiddenLine xmlns:a14="http://schemas.microsoft.com/office/drawing/2010/main" w="9525">
                 <a:solidFill>
                   <a:schemeClr val="tx1"/>
                 </a:solidFill>
@@ -8328,7 +8144,7 @@
     </p:spTree>
     <p:extLst>
       <p:ext uri="{BB962C8B-B14F-4D97-AF65-F5344CB8AC3E}">
-        <p14:creationId xmlns="" xmlns:p14="http://schemas.microsoft.com/office/powerpoint/2010/main" val="97183072"/>
+        <p14:creationId xmlns:p14="http://schemas.microsoft.com/office/powerpoint/2010/main" val="97183072"/>
       </p:ext>
     </p:extLst>
   </p:cSld>
@@ -8371,10 +8187,9 @@
           <a:lstStyle/>
           <a:p>
             <a:r>
-              <a:rPr lang="en-US" smtClean="0"/>
+              <a:rPr lang="en-US"/>
               <a:t>Accumulator Register</a:t>
             </a:r>
-            <a:endParaRPr lang="en-US"/>
           </a:p>
         </p:txBody>
       </p:sp>
@@ -8454,10 +8269,9 @@
           <a:lstStyle/>
           <a:p>
             <a:r>
-              <a:rPr lang="en-IN" dirty="0" smtClean="0"/>
+              <a:rPr lang="en-IN" dirty="0"/>
               <a:t>Design of arithmetic and logic circuits</a:t>
             </a:r>
-            <a:endParaRPr lang="en-IN" dirty="0"/>
           </a:p>
         </p:txBody>
       </p:sp>
@@ -8475,7 +8289,7 @@
           <a:blip r:embed="rId2">
             <a:extLst>
               <a:ext uri="{28A0092B-C50C-407E-A947-70E740481C1C}">
-                <a14:useLocalDpi xmlns="" xmlns:a14="http://schemas.microsoft.com/office/drawing/2010/main" val="0"/>
+                <a14:useLocalDpi xmlns:a14="http://schemas.microsoft.com/office/drawing/2010/main" val="0"/>
               </a:ext>
             </a:extLst>
           </a:blip>
@@ -8498,14 +8312,14 @@
           </a:ln>
           <a:extLst>
             <a:ext uri="{909E8E84-426E-40DD-AFC4-6F175D3DCCD1}">
-              <a14:hiddenFill xmlns="" xmlns:a14="http://schemas.microsoft.com/office/drawing/2010/main">
+              <a14:hiddenFill xmlns:a14="http://schemas.microsoft.com/office/drawing/2010/main">
                 <a:solidFill>
                   <a:schemeClr val="accent1"/>
                 </a:solidFill>
               </a14:hiddenFill>
             </a:ext>
             <a:ext uri="{91240B29-F687-4F45-9708-019B960494DF}">
-              <a14:hiddenLine xmlns="" xmlns:a14="http://schemas.microsoft.com/office/drawing/2010/main" w="9525">
+              <a14:hiddenLine xmlns:a14="http://schemas.microsoft.com/office/drawing/2010/main" w="9525">
                 <a:solidFill>
                   <a:schemeClr val="tx1"/>
                 </a:solidFill>
@@ -8520,20 +8334,13 @@
     </p:spTree>
     <p:extLst>
       <p:ext uri="{BB962C8B-B14F-4D97-AF65-F5344CB8AC3E}">
-        <p14:creationId xmlns="" xmlns:p14="http://schemas.microsoft.com/office/powerpoint/2010/main" val="4148610249"/>
+        <p14:creationId xmlns:p14="http://schemas.microsoft.com/office/powerpoint/2010/main" val="4148610249"/>
       </p:ext>
     </p:extLst>
   </p:cSld>
   <p:clrMapOvr>
     <a:masterClrMapping/>
   </p:clrMapOvr>
-  <p:timing>
-    <p:tnLst>
-      <p:par>
-        <p:cTn id="1" dur="indefinite" restart="never" nodeType="tmRoot"/>
-      </p:par>
-    </p:tnLst>
-  </p:timing>
 </p:sld>
 </file>
 
@@ -8588,17 +8395,17 @@
           <a:bodyPr/>
           <a:lstStyle/>
           <a:p>
-            <a:endParaRPr lang="en-IN" dirty="0" smtClean="0"/>
-          </a:p>
-          <a:p>
             <a:endParaRPr lang="en-IN" dirty="0"/>
           </a:p>
           <a:p>
-            <a:endParaRPr lang="en-IN" dirty="0" smtClean="0"/>
-          </a:p>
-          <a:p>
-            <a:r>
-              <a:rPr lang="en-IN" dirty="0" smtClean="0"/>
+            <a:endParaRPr lang="en-IN" dirty="0"/>
+          </a:p>
+          <a:p>
+            <a:endParaRPr lang="en-IN" dirty="0"/>
+          </a:p>
+          <a:p>
+            <a:r>
+              <a:rPr lang="en-IN" dirty="0"/>
               <a:t>Implemented in 3 steps:</a:t>
             </a:r>
           </a:p>
@@ -8608,7 +8415,7 @@
               <a:buAutoNum type="arabicPeriod"/>
             </a:pPr>
             <a:r>
-              <a:rPr lang="en-IN" dirty="0" smtClean="0"/>
+              <a:rPr lang="en-IN" dirty="0"/>
               <a:t>Design of arithmetic section</a:t>
             </a:r>
           </a:p>
@@ -8618,7 +8425,7 @@
               <a:buAutoNum type="arabicPeriod"/>
             </a:pPr>
             <a:r>
-              <a:rPr lang="en-IN" dirty="0" smtClean="0"/>
+              <a:rPr lang="en-IN" dirty="0"/>
               <a:t>Design of logic section</a:t>
             </a:r>
           </a:p>
@@ -8628,30 +8435,22 @@
               <a:buAutoNum type="arabicPeriod"/>
             </a:pPr>
             <a:r>
-              <a:rPr lang="en-IN" dirty="0" smtClean="0"/>
+              <a:rPr lang="en-IN" dirty="0"/>
               <a:t>Modification of arithmetic section to include logic too</a:t>
             </a:r>
-            <a:endParaRPr lang="en-IN" dirty="0"/>
           </a:p>
         </p:txBody>
       </p:sp>
     </p:spTree>
     <p:extLst>
       <p:ext uri="{BB962C8B-B14F-4D97-AF65-F5344CB8AC3E}">
-        <p14:creationId xmlns="" xmlns:p14="http://schemas.microsoft.com/office/powerpoint/2010/main" val="1466088895"/>
+        <p14:creationId xmlns:p14="http://schemas.microsoft.com/office/powerpoint/2010/main" val="1466088895"/>
       </p:ext>
     </p:extLst>
   </p:cSld>
   <p:clrMapOvr>
     <a:masterClrMapping/>
   </p:clrMapOvr>
-  <p:timing>
-    <p:tnLst>
-      <p:par>
-        <p:cTn id="1" dur="indefinite" restart="never" nodeType="tmRoot"/>
-      </p:par>
-    </p:tnLst>
-  </p:timing>
 </p:sld>
 </file>
 

</xml_diff>